<commit_message>
Completed SQL Injection Presentation
Updated Intro Presentation
</commit_message>
<xml_diff>
--- a/presentations/9-16_GreyHat_SQL_Injection.pptx
+++ b/presentations/9-16_GreyHat_SQL_Injection.pptx
@@ -5,7 +5,7 @@
     <p:sldMasterId id="2147483648" r:id="rId1"/>
   </p:sldMasterIdLst>
   <p:notesMasterIdLst>
-    <p:notesMasterId r:id="rId24"/>
+    <p:notesMasterId r:id="rId25"/>
   </p:notesMasterIdLst>
   <p:sldIdLst>
     <p:sldId id="256" r:id="rId2"/>
@@ -27,9 +27,10 @@
     <p:sldId id="273" r:id="rId18"/>
     <p:sldId id="275" r:id="rId19"/>
     <p:sldId id="270" r:id="rId20"/>
-    <p:sldId id="274" r:id="rId21"/>
-    <p:sldId id="276" r:id="rId22"/>
-    <p:sldId id="277" r:id="rId23"/>
+    <p:sldId id="278" r:id="rId21"/>
+    <p:sldId id="274" r:id="rId22"/>
+    <p:sldId id="276" r:id="rId23"/>
+    <p:sldId id="277" r:id="rId24"/>
   </p:sldIdLst>
   <p:sldSz cx="12192000" cy="6858000"/>
   <p:notesSz cx="6858000" cy="9144000"/>
@@ -128,6 +129,11 @@
       </a:defRPr>
     </a:lvl9pPr>
   </p:defaultTextStyle>
+  <p:extLst>
+    <p:ext uri="{EFAFB233-063F-42B5-8137-9DF3F51BA10A}">
+      <p15:sldGuideLst xmlns:p15="http://schemas.microsoft.com/office/powerpoint/2012/main"/>
+    </p:ext>
+  </p:extLst>
 </p:presentation>
 </file>
 
@@ -213,7 +219,7 @@
           <a:p>
             <a:fld id="{05B5379F-3DD3-451D-A018-85B7E5E318F6}" type="datetimeFigureOut">
               <a:rPr lang="en-US" smtClean="0"/>
-              <a:t>8/25/2016</a:t>
+              <a:t>8/27/2016</a:t>
             </a:fld>
             <a:endParaRPr lang="en-US"/>
           </a:p>
@@ -308,7 +314,6 @@
               <a:rPr lang="en-US"/>
               <a:t>Fifth level</a:t>
             </a:r>
-            <a:endParaRPr lang="en-US"/>
           </a:p>
         </p:txBody>
       </p:sp>
@@ -527,23 +532,23 @@
           <a:p>
             <a:r>
               <a:rPr lang="en-US" dirty="0"/>
-              <a:t>OWASP – non profit</a:t>
+              <a:t>Simple –</a:t>
             </a:r>
             <a:r>
               <a:rPr lang="en-US" baseline="0" dirty="0"/>
-              <a:t> focused on improving security of software worldwide.</a:t>
+              <a:t> We’ll see in a bit</a:t>
             </a:r>
           </a:p>
           <a:p>
             <a:r>
               <a:rPr lang="en-US" baseline="0" dirty="0"/>
-              <a:t>Best Practices</a:t>
+              <a:t>Error Based – Look at error messages that leak implementation details about database</a:t>
             </a:r>
           </a:p>
           <a:p>
             <a:r>
               <a:rPr lang="en-US" baseline="0" dirty="0"/>
-              <a:t>All the materials are free, books, etc.</a:t>
+              <a:t>Blind – Generic error message</a:t>
             </a:r>
             <a:endParaRPr lang="en-US" dirty="0"/>
           </a:p>
@@ -566,7 +571,7 @@
           <a:p>
             <a:fld id="{56B7243C-671F-48EC-8863-87A08C87F3F9}" type="slidenum">
               <a:rPr lang="en-US" smtClean="0"/>
-              <a:t>3</a:t>
+              <a:t>2</a:t>
             </a:fld>
             <a:endParaRPr lang="en-US"/>
           </a:p>
@@ -575,7 +580,7 @@
     </p:spTree>
     <p:extLst>
       <p:ext uri="{BB962C8B-B14F-4D97-AF65-F5344CB8AC3E}">
-        <p14:creationId xmlns:p14="http://schemas.microsoft.com/office/powerpoint/2010/main" val="3183102363"/>
+        <p14:creationId xmlns:p14="http://schemas.microsoft.com/office/powerpoint/2010/main" val="1156590258"/>
       </p:ext>
     </p:extLst>
   </p:cSld>
@@ -631,31 +636,23 @@
           <a:p>
             <a:r>
               <a:rPr lang="en-US" dirty="0"/>
-              <a:t>If you came to CTF practice last year this will look familiar</a:t>
-            </a:r>
-          </a:p>
-          <a:p>
-            <a:r>
-              <a:rPr lang="en-US" dirty="0"/>
-              <a:t>Solution:</a:t>
+              <a:t>OWASP – non profit</a:t>
             </a:r>
             <a:r>
               <a:rPr lang="en-US" baseline="0" dirty="0"/>
-              <a:t> </a:t>
-            </a:r>
-            <a:r>
-              <a:rPr lang="en-US" dirty="0"/>
-              <a:t>‘ OR</a:t>
-            </a:r>
+              <a:t> focused on improving security of software worldwide.</a:t>
+            </a:r>
+          </a:p>
+          <a:p>
             <a:r>
               <a:rPr lang="en-US" baseline="0" dirty="0"/>
-              <a:t> ‘1’=‘1</a:t>
+              <a:t>Best Practices</a:t>
             </a:r>
           </a:p>
           <a:p>
             <a:r>
               <a:rPr lang="en-US" baseline="0" dirty="0"/>
-              <a:t>Side Note: This is why we always store password hashes!</a:t>
+              <a:t>All the materials are free, books, etc.</a:t>
             </a:r>
             <a:endParaRPr lang="en-US" dirty="0"/>
           </a:p>
@@ -678,7 +675,7 @@
           <a:p>
             <a:fld id="{56B7243C-671F-48EC-8863-87A08C87F3F9}" type="slidenum">
               <a:rPr lang="en-US" smtClean="0"/>
-              <a:t>13</a:t>
+              <a:t>3</a:t>
             </a:fld>
             <a:endParaRPr lang="en-US"/>
           </a:p>
@@ -687,7 +684,7 @@
     </p:spTree>
     <p:extLst>
       <p:ext uri="{BB962C8B-B14F-4D97-AF65-F5344CB8AC3E}">
-        <p14:creationId xmlns:p14="http://schemas.microsoft.com/office/powerpoint/2010/main" val="203040498"/>
+        <p14:creationId xmlns:p14="http://schemas.microsoft.com/office/powerpoint/2010/main" val="3183102363"/>
       </p:ext>
     </p:extLst>
   </p:cSld>
@@ -743,11 +740,17 @@
           <a:p>
             <a:r>
               <a:rPr lang="en-US" dirty="0"/>
-              <a:t>Before, we guessed</a:t>
+              <a:t>User</a:t>
             </a:r>
             <a:r>
               <a:rPr lang="en-US" baseline="0" dirty="0"/>
-              <a:t> at the table names. Now, we have the server giving it all up to us by default.</a:t>
+              <a:t> input is evaluated directly without any preprocessing</a:t>
+            </a:r>
+          </a:p>
+          <a:p>
+            <a:r>
+              <a:rPr lang="en-US" baseline="0" dirty="0"/>
+              <a:t>To remove special characters and such</a:t>
             </a:r>
             <a:endParaRPr lang="en-US" dirty="0"/>
           </a:p>
@@ -770,7 +773,7 @@
           <a:p>
             <a:fld id="{56B7243C-671F-48EC-8863-87A08C87F3F9}" type="slidenum">
               <a:rPr lang="en-US" smtClean="0"/>
-              <a:t>14</a:t>
+              <a:t>10</a:t>
             </a:fld>
             <a:endParaRPr lang="en-US"/>
           </a:p>
@@ -779,7 +782,7 @@
     </p:spTree>
     <p:extLst>
       <p:ext uri="{BB962C8B-B14F-4D97-AF65-F5344CB8AC3E}">
-        <p14:creationId xmlns:p14="http://schemas.microsoft.com/office/powerpoint/2010/main" val="3697427944"/>
+        <p14:creationId xmlns:p14="http://schemas.microsoft.com/office/powerpoint/2010/main" val="2718314508"/>
       </p:ext>
     </p:extLst>
   </p:cSld>
@@ -835,6 +838,397 @@
           <a:p>
             <a:r>
               <a:rPr lang="en-US" dirty="0"/>
+              <a:t>If</a:t>
+            </a:r>
+            <a:r>
+              <a:rPr lang="en-US" baseline="0" dirty="0"/>
+              <a:t> you’re being astute – not really true.</a:t>
+            </a:r>
+          </a:p>
+          <a:p>
+            <a:r>
+              <a:rPr lang="en-US" baseline="0" dirty="0"/>
+              <a:t>What am I doing with the password field, and why?</a:t>
+            </a:r>
+            <a:endParaRPr lang="en-US" dirty="0"/>
+          </a:p>
+        </p:txBody>
+      </p:sp>
+      <p:sp>
+        <p:nvSpPr>
+          <p:cNvPr id="4" name="Slide Number Placeholder 3"/>
+          <p:cNvSpPr>
+            <a:spLocks noGrp="1"/>
+          </p:cNvSpPr>
+          <p:nvPr>
+            <p:ph type="sldNum" sz="quarter" idx="10"/>
+          </p:nvPr>
+        </p:nvSpPr>
+        <p:spPr/>
+        <p:txBody>
+          <a:bodyPr/>
+          <a:lstStyle/>
+          <a:p>
+            <a:fld id="{56B7243C-671F-48EC-8863-87A08C87F3F9}" type="slidenum">
+              <a:rPr lang="en-US" smtClean="0"/>
+              <a:t>11</a:t>
+            </a:fld>
+            <a:endParaRPr lang="en-US"/>
+          </a:p>
+        </p:txBody>
+      </p:sp>
+    </p:spTree>
+    <p:extLst>
+      <p:ext uri="{BB962C8B-B14F-4D97-AF65-F5344CB8AC3E}">
+        <p14:creationId xmlns:p14="http://schemas.microsoft.com/office/powerpoint/2010/main" val="3863150947"/>
+      </p:ext>
+    </p:extLst>
+  </p:cSld>
+  <p:clrMapOvr>
+    <a:masterClrMapping/>
+  </p:clrMapOvr>
+</p:notes>
+</file>
+
+<file path=ppt/notesSlides/notesSlide5.xml><?xml version="1.0" encoding="utf-8"?>
+<p:notes xmlns:a="http://schemas.openxmlformats.org/drawingml/2006/main" xmlns:r="http://schemas.openxmlformats.org/officeDocument/2006/relationships" xmlns:p="http://schemas.openxmlformats.org/presentationml/2006/main">
+  <p:cSld>
+    <p:spTree>
+      <p:nvGrpSpPr>
+        <p:cNvPr id="1" name=""/>
+        <p:cNvGrpSpPr/>
+        <p:nvPr/>
+      </p:nvGrpSpPr>
+      <p:grpSpPr>
+        <a:xfrm>
+          <a:off x="0" y="0"/>
+          <a:ext cx="0" cy="0"/>
+          <a:chOff x="0" y="0"/>
+          <a:chExt cx="0" cy="0"/>
+        </a:xfrm>
+      </p:grpSpPr>
+      <p:sp>
+        <p:nvSpPr>
+          <p:cNvPr id="2" name="Slide Image Placeholder 1"/>
+          <p:cNvSpPr>
+            <a:spLocks noGrp="1" noRot="1" noChangeAspect="1"/>
+          </p:cNvSpPr>
+          <p:nvPr>
+            <p:ph type="sldImg"/>
+          </p:nvPr>
+        </p:nvSpPr>
+        <p:spPr/>
+      </p:sp>
+      <p:sp>
+        <p:nvSpPr>
+          <p:cNvPr id="3" name="Notes Placeholder 2"/>
+          <p:cNvSpPr>
+            <a:spLocks noGrp="1"/>
+          </p:cNvSpPr>
+          <p:nvPr>
+            <p:ph type="body" idx="1"/>
+          </p:nvPr>
+        </p:nvSpPr>
+        <p:spPr/>
+        <p:txBody>
+          <a:bodyPr/>
+          <a:lstStyle/>
+          <a:p>
+            <a:r>
+              <a:rPr lang="en-US" dirty="0"/>
+              <a:t>Attention – why did I put the two dashes?</a:t>
+            </a:r>
+          </a:p>
+          <a:p>
+            <a:endParaRPr lang="en-US" dirty="0"/>
+          </a:p>
+        </p:txBody>
+      </p:sp>
+      <p:sp>
+        <p:nvSpPr>
+          <p:cNvPr id="4" name="Slide Number Placeholder 3"/>
+          <p:cNvSpPr>
+            <a:spLocks noGrp="1"/>
+          </p:cNvSpPr>
+          <p:nvPr>
+            <p:ph type="sldNum" sz="quarter" idx="10"/>
+          </p:nvPr>
+        </p:nvSpPr>
+        <p:spPr/>
+        <p:txBody>
+          <a:bodyPr/>
+          <a:lstStyle/>
+          <a:p>
+            <a:fld id="{56B7243C-671F-48EC-8863-87A08C87F3F9}" type="slidenum">
+              <a:rPr lang="en-US" smtClean="0"/>
+              <a:t>12</a:t>
+            </a:fld>
+            <a:endParaRPr lang="en-US"/>
+          </a:p>
+        </p:txBody>
+      </p:sp>
+    </p:spTree>
+    <p:extLst>
+      <p:ext uri="{BB962C8B-B14F-4D97-AF65-F5344CB8AC3E}">
+        <p14:creationId xmlns:p14="http://schemas.microsoft.com/office/powerpoint/2010/main" val="1985603126"/>
+      </p:ext>
+    </p:extLst>
+  </p:cSld>
+  <p:clrMapOvr>
+    <a:masterClrMapping/>
+  </p:clrMapOvr>
+</p:notes>
+</file>
+
+<file path=ppt/notesSlides/notesSlide6.xml><?xml version="1.0" encoding="utf-8"?>
+<p:notes xmlns:a="http://schemas.openxmlformats.org/drawingml/2006/main" xmlns:r="http://schemas.openxmlformats.org/officeDocument/2006/relationships" xmlns:p="http://schemas.openxmlformats.org/presentationml/2006/main">
+  <p:cSld>
+    <p:spTree>
+      <p:nvGrpSpPr>
+        <p:cNvPr id="1" name=""/>
+        <p:cNvGrpSpPr/>
+        <p:nvPr/>
+      </p:nvGrpSpPr>
+      <p:grpSpPr>
+        <a:xfrm>
+          <a:off x="0" y="0"/>
+          <a:ext cx="0" cy="0"/>
+          <a:chOff x="0" y="0"/>
+          <a:chExt cx="0" cy="0"/>
+        </a:xfrm>
+      </p:grpSpPr>
+      <p:sp>
+        <p:nvSpPr>
+          <p:cNvPr id="2" name="Slide Image Placeholder 1"/>
+          <p:cNvSpPr>
+            <a:spLocks noGrp="1" noRot="1" noChangeAspect="1"/>
+          </p:cNvSpPr>
+          <p:nvPr>
+            <p:ph type="sldImg"/>
+          </p:nvPr>
+        </p:nvSpPr>
+        <p:spPr/>
+      </p:sp>
+      <p:sp>
+        <p:nvSpPr>
+          <p:cNvPr id="3" name="Notes Placeholder 2"/>
+          <p:cNvSpPr>
+            <a:spLocks noGrp="1"/>
+          </p:cNvSpPr>
+          <p:nvPr>
+            <p:ph type="body" idx="1"/>
+          </p:nvPr>
+        </p:nvSpPr>
+        <p:spPr/>
+        <p:txBody>
+          <a:bodyPr/>
+          <a:lstStyle/>
+          <a:p>
+            <a:r>
+              <a:rPr lang="en-US" dirty="0"/>
+              <a:t>If you came to CTF practice last year this will look familiar</a:t>
+            </a:r>
+          </a:p>
+          <a:p>
+            <a:r>
+              <a:rPr lang="en-US" dirty="0"/>
+              <a:t>Simple, textbook SQL</a:t>
+            </a:r>
+            <a:r>
+              <a:rPr lang="en-US" baseline="0" dirty="0"/>
+              <a:t> injection – make a statement that evaluates to TRUE for every row</a:t>
+            </a:r>
+            <a:endParaRPr lang="en-US" dirty="0"/>
+          </a:p>
+          <a:p>
+            <a:r>
+              <a:rPr lang="en-US" baseline="0" dirty="0"/>
+              <a:t>Side Note: This is why we always store password hashes!</a:t>
+            </a:r>
+            <a:endParaRPr lang="en-US" dirty="0"/>
+          </a:p>
+        </p:txBody>
+      </p:sp>
+      <p:sp>
+        <p:nvSpPr>
+          <p:cNvPr id="4" name="Slide Number Placeholder 3"/>
+          <p:cNvSpPr>
+            <a:spLocks noGrp="1"/>
+          </p:cNvSpPr>
+          <p:nvPr>
+            <p:ph type="sldNum" sz="quarter" idx="10"/>
+          </p:nvPr>
+        </p:nvSpPr>
+        <p:spPr/>
+        <p:txBody>
+          <a:bodyPr/>
+          <a:lstStyle/>
+          <a:p>
+            <a:fld id="{56B7243C-671F-48EC-8863-87A08C87F3F9}" type="slidenum">
+              <a:rPr lang="en-US" smtClean="0"/>
+              <a:t>13</a:t>
+            </a:fld>
+            <a:endParaRPr lang="en-US"/>
+          </a:p>
+        </p:txBody>
+      </p:sp>
+    </p:spTree>
+    <p:extLst>
+      <p:ext uri="{BB962C8B-B14F-4D97-AF65-F5344CB8AC3E}">
+        <p14:creationId xmlns:p14="http://schemas.microsoft.com/office/powerpoint/2010/main" val="203040498"/>
+      </p:ext>
+    </p:extLst>
+  </p:cSld>
+  <p:clrMapOvr>
+    <a:masterClrMapping/>
+  </p:clrMapOvr>
+</p:notes>
+</file>
+
+<file path=ppt/notesSlides/notesSlide7.xml><?xml version="1.0" encoding="utf-8"?>
+<p:notes xmlns:a="http://schemas.openxmlformats.org/drawingml/2006/main" xmlns:r="http://schemas.openxmlformats.org/officeDocument/2006/relationships" xmlns:p="http://schemas.openxmlformats.org/presentationml/2006/main">
+  <p:cSld>
+    <p:spTree>
+      <p:nvGrpSpPr>
+        <p:cNvPr id="1" name=""/>
+        <p:cNvGrpSpPr/>
+        <p:nvPr/>
+      </p:nvGrpSpPr>
+      <p:grpSpPr>
+        <a:xfrm>
+          <a:off x="0" y="0"/>
+          <a:ext cx="0" cy="0"/>
+          <a:chOff x="0" y="0"/>
+          <a:chExt cx="0" cy="0"/>
+        </a:xfrm>
+      </p:grpSpPr>
+      <p:sp>
+        <p:nvSpPr>
+          <p:cNvPr id="2" name="Slide Image Placeholder 1"/>
+          <p:cNvSpPr>
+            <a:spLocks noGrp="1" noRot="1" noChangeAspect="1"/>
+          </p:cNvSpPr>
+          <p:nvPr>
+            <p:ph type="sldImg"/>
+          </p:nvPr>
+        </p:nvSpPr>
+        <p:spPr/>
+      </p:sp>
+      <p:sp>
+        <p:nvSpPr>
+          <p:cNvPr id="3" name="Notes Placeholder 2"/>
+          <p:cNvSpPr>
+            <a:spLocks noGrp="1"/>
+          </p:cNvSpPr>
+          <p:nvPr>
+            <p:ph type="body" idx="1"/>
+          </p:nvPr>
+        </p:nvSpPr>
+        <p:spPr/>
+        <p:txBody>
+          <a:bodyPr/>
+          <a:lstStyle/>
+          <a:p>
+            <a:r>
+              <a:rPr lang="en-US" dirty="0"/>
+              <a:t>Before, we guessed</a:t>
+            </a:r>
+            <a:r>
+              <a:rPr lang="en-US" baseline="0" dirty="0"/>
+              <a:t> at the table names. Now, we have the server giving it all up to us by default.</a:t>
+            </a:r>
+          </a:p>
+          <a:p>
+            <a:r>
+              <a:rPr lang="en-US" baseline="0" dirty="0"/>
+              <a:t>Won’t go into details of it but just know that error based SQL injection is a simple task.</a:t>
+            </a:r>
+            <a:endParaRPr lang="en-US" dirty="0"/>
+          </a:p>
+        </p:txBody>
+      </p:sp>
+      <p:sp>
+        <p:nvSpPr>
+          <p:cNvPr id="4" name="Slide Number Placeholder 3"/>
+          <p:cNvSpPr>
+            <a:spLocks noGrp="1"/>
+          </p:cNvSpPr>
+          <p:nvPr>
+            <p:ph type="sldNum" sz="quarter" idx="10"/>
+          </p:nvPr>
+        </p:nvSpPr>
+        <p:spPr/>
+        <p:txBody>
+          <a:bodyPr/>
+          <a:lstStyle/>
+          <a:p>
+            <a:fld id="{56B7243C-671F-48EC-8863-87A08C87F3F9}" type="slidenum">
+              <a:rPr lang="en-US" smtClean="0"/>
+              <a:t>14</a:t>
+            </a:fld>
+            <a:endParaRPr lang="en-US"/>
+          </a:p>
+        </p:txBody>
+      </p:sp>
+    </p:spTree>
+    <p:extLst>
+      <p:ext uri="{BB962C8B-B14F-4D97-AF65-F5344CB8AC3E}">
+        <p14:creationId xmlns:p14="http://schemas.microsoft.com/office/powerpoint/2010/main" val="3697427944"/>
+      </p:ext>
+    </p:extLst>
+  </p:cSld>
+  <p:clrMapOvr>
+    <a:masterClrMapping/>
+  </p:clrMapOvr>
+</p:notes>
+</file>
+
+<file path=ppt/notesSlides/notesSlide8.xml><?xml version="1.0" encoding="utf-8"?>
+<p:notes xmlns:a="http://schemas.openxmlformats.org/drawingml/2006/main" xmlns:r="http://schemas.openxmlformats.org/officeDocument/2006/relationships" xmlns:p="http://schemas.openxmlformats.org/presentationml/2006/main">
+  <p:cSld>
+    <p:spTree>
+      <p:nvGrpSpPr>
+        <p:cNvPr id="1" name=""/>
+        <p:cNvGrpSpPr/>
+        <p:nvPr/>
+      </p:nvGrpSpPr>
+      <p:grpSpPr>
+        <a:xfrm>
+          <a:off x="0" y="0"/>
+          <a:ext cx="0" cy="0"/>
+          <a:chOff x="0" y="0"/>
+          <a:chExt cx="0" cy="0"/>
+        </a:xfrm>
+      </p:grpSpPr>
+      <p:sp>
+        <p:nvSpPr>
+          <p:cNvPr id="2" name="Slide Image Placeholder 1"/>
+          <p:cNvSpPr>
+            <a:spLocks noGrp="1" noRot="1" noChangeAspect="1"/>
+          </p:cNvSpPr>
+          <p:nvPr>
+            <p:ph type="sldImg"/>
+          </p:nvPr>
+        </p:nvSpPr>
+        <p:spPr/>
+      </p:sp>
+      <p:sp>
+        <p:nvSpPr>
+          <p:cNvPr id="3" name="Notes Placeholder 2"/>
+          <p:cNvSpPr>
+            <a:spLocks noGrp="1"/>
+          </p:cNvSpPr>
+          <p:nvPr>
+            <p:ph type="body" idx="1"/>
+          </p:nvPr>
+        </p:nvSpPr>
+        <p:spPr/>
+        <p:txBody>
+          <a:bodyPr/>
+          <a:lstStyle/>
+          <a:p>
+            <a:r>
+              <a:rPr lang="en-US" dirty="0"/>
               <a:t>~7 requests per character.</a:t>
             </a:r>
           </a:p>
@@ -878,6 +1272,90 @@
     <p:extLst>
       <p:ext uri="{BB962C8B-B14F-4D97-AF65-F5344CB8AC3E}">
         <p14:creationId xmlns:p14="http://schemas.microsoft.com/office/powerpoint/2010/main" val="3836328035"/>
+      </p:ext>
+    </p:extLst>
+  </p:cSld>
+  <p:clrMapOvr>
+    <a:masterClrMapping/>
+  </p:clrMapOvr>
+</p:notes>
+</file>
+
+<file path=ppt/notesSlides/notesSlide9.xml><?xml version="1.0" encoding="utf-8"?>
+<p:notes xmlns:a="http://schemas.openxmlformats.org/drawingml/2006/main" xmlns:r="http://schemas.openxmlformats.org/officeDocument/2006/relationships" xmlns:p="http://schemas.openxmlformats.org/presentationml/2006/main">
+  <p:cSld>
+    <p:spTree>
+      <p:nvGrpSpPr>
+        <p:cNvPr id="1" name=""/>
+        <p:cNvGrpSpPr/>
+        <p:nvPr/>
+      </p:nvGrpSpPr>
+      <p:grpSpPr>
+        <a:xfrm>
+          <a:off x="0" y="0"/>
+          <a:ext cx="0" cy="0"/>
+          <a:chOff x="0" y="0"/>
+          <a:chExt cx="0" cy="0"/>
+        </a:xfrm>
+      </p:grpSpPr>
+      <p:sp>
+        <p:nvSpPr>
+          <p:cNvPr id="2" name="Slide Image Placeholder 1"/>
+          <p:cNvSpPr>
+            <a:spLocks noGrp="1" noRot="1" noChangeAspect="1"/>
+          </p:cNvSpPr>
+          <p:nvPr>
+            <p:ph type="sldImg"/>
+          </p:nvPr>
+        </p:nvSpPr>
+        <p:spPr/>
+      </p:sp>
+      <p:sp>
+        <p:nvSpPr>
+          <p:cNvPr id="3" name="Notes Placeholder 2"/>
+          <p:cNvSpPr>
+            <a:spLocks noGrp="1"/>
+          </p:cNvSpPr>
+          <p:nvPr>
+            <p:ph type="body" idx="1"/>
+          </p:nvPr>
+        </p:nvSpPr>
+        <p:spPr/>
+        <p:txBody>
+          <a:bodyPr/>
+          <a:lstStyle/>
+          <a:p>
+            <a:endParaRPr lang="en-US" dirty="0"/>
+          </a:p>
+        </p:txBody>
+      </p:sp>
+      <p:sp>
+        <p:nvSpPr>
+          <p:cNvPr id="4" name="Slide Number Placeholder 3"/>
+          <p:cNvSpPr>
+            <a:spLocks noGrp="1"/>
+          </p:cNvSpPr>
+          <p:nvPr>
+            <p:ph type="sldNum" sz="quarter" idx="10"/>
+          </p:nvPr>
+        </p:nvSpPr>
+        <p:spPr/>
+        <p:txBody>
+          <a:bodyPr/>
+          <a:lstStyle/>
+          <a:p>
+            <a:fld id="{56B7243C-671F-48EC-8863-87A08C87F3F9}" type="slidenum">
+              <a:rPr lang="en-US" smtClean="0"/>
+              <a:t>18</a:t>
+            </a:fld>
+            <a:endParaRPr lang="en-US"/>
+          </a:p>
+        </p:txBody>
+      </p:sp>
+    </p:spTree>
+    <p:extLst>
+      <p:ext uri="{BB962C8B-B14F-4D97-AF65-F5344CB8AC3E}">
+        <p14:creationId xmlns:p14="http://schemas.microsoft.com/office/powerpoint/2010/main" val="4115708187"/>
       </p:ext>
     </p:extLst>
   </p:cSld>
@@ -1133,7 +1611,7 @@
             <a:fld id="{B61BEF0D-F0BB-DE4B-95CE-6DB70DBA9567}" type="datetimeFigureOut">
               <a:rPr lang="en-US" dirty="0"/>
               <a:pPr/>
-              <a:t>8/25/2016</a:t>
+              <a:t>8/27/2016</a:t>
             </a:fld>
             <a:endParaRPr lang="en-US" dirty="0"/>
           </a:p>
@@ -1392,7 +1870,7 @@
             <a:fld id="{B61BEF0D-F0BB-DE4B-95CE-6DB70DBA9567}" type="datetimeFigureOut">
               <a:rPr lang="en-US" dirty="0"/>
               <a:pPr/>
-              <a:t>8/25/2016</a:t>
+              <a:t>8/27/2016</a:t>
             </a:fld>
             <a:endParaRPr lang="en-US" dirty="0"/>
           </a:p>
@@ -1624,7 +2102,7 @@
             <a:fld id="{B61BEF0D-F0BB-DE4B-95CE-6DB70DBA9567}" type="datetimeFigureOut">
               <a:rPr lang="en-US" dirty="0"/>
               <a:pPr/>
-              <a:t>8/25/2016</a:t>
+              <a:t>8/27/2016</a:t>
             </a:fld>
             <a:endParaRPr lang="en-US" dirty="0"/>
           </a:p>
@@ -1861,7 +2339,7 @@
             <a:fld id="{B61BEF0D-F0BB-DE4B-95CE-6DB70DBA9567}" type="datetimeFigureOut">
               <a:rPr lang="en-US" dirty="0"/>
               <a:pPr/>
-              <a:t>8/25/2016</a:t>
+              <a:t>8/27/2016</a:t>
             </a:fld>
             <a:endParaRPr lang="en-US" dirty="0"/>
           </a:p>
@@ -2165,7 +2643,7 @@
             <a:fld id="{B61BEF0D-F0BB-DE4B-95CE-6DB70DBA9567}" type="datetimeFigureOut">
               <a:rPr lang="en-US" dirty="0"/>
               <a:pPr/>
-              <a:t>8/25/2016</a:t>
+              <a:t>8/27/2016</a:t>
             </a:fld>
             <a:endParaRPr lang="en-US" dirty="0"/>
           </a:p>
@@ -2464,7 +2942,7 @@
             <a:fld id="{B61BEF0D-F0BB-DE4B-95CE-6DB70DBA9567}" type="datetimeFigureOut">
               <a:rPr lang="en-US" dirty="0"/>
               <a:pPr/>
-              <a:t>8/25/2016</a:t>
+              <a:t>8/27/2016</a:t>
             </a:fld>
             <a:endParaRPr lang="en-US" dirty="0"/>
           </a:p>
@@ -2883,7 +3361,7 @@
             <a:fld id="{B61BEF0D-F0BB-DE4B-95CE-6DB70DBA9567}" type="datetimeFigureOut">
               <a:rPr lang="en-US" dirty="0"/>
               <a:pPr/>
-              <a:t>8/25/2016</a:t>
+              <a:t>8/27/2016</a:t>
             </a:fld>
             <a:endParaRPr lang="en-US" dirty="0"/>
           </a:p>
@@ -3042,7 +3520,7 @@
             <a:fld id="{B61BEF0D-F0BB-DE4B-95CE-6DB70DBA9567}" type="datetimeFigureOut">
               <a:rPr lang="en-US" dirty="0"/>
               <a:pPr/>
-              <a:t>8/25/2016</a:t>
+              <a:t>8/27/2016</a:t>
             </a:fld>
             <a:endParaRPr lang="en-US" dirty="0"/>
           </a:p>
@@ -3134,7 +3612,7 @@
             <a:fld id="{B61BEF0D-F0BB-DE4B-95CE-6DB70DBA9567}" type="datetimeFigureOut">
               <a:rPr lang="en-US" dirty="0"/>
               <a:pPr/>
-              <a:t>8/25/2016</a:t>
+              <a:t>8/27/2016</a:t>
             </a:fld>
             <a:endParaRPr lang="en-US" dirty="0"/>
           </a:p>
@@ -3509,7 +3987,7 @@
             <a:fld id="{B61BEF0D-F0BB-DE4B-95CE-6DB70DBA9567}" type="datetimeFigureOut">
               <a:rPr lang="en-US" dirty="0"/>
               <a:pPr/>
-              <a:t>8/25/2016</a:t>
+              <a:t>8/27/2016</a:t>
             </a:fld>
             <a:endParaRPr lang="en-US" dirty="0"/>
           </a:p>
@@ -3795,7 +4273,7 @@
             <a:fld id="{B61BEF0D-F0BB-DE4B-95CE-6DB70DBA9567}" type="datetimeFigureOut">
               <a:rPr lang="en-US" dirty="0"/>
               <a:pPr/>
-              <a:t>8/25/2016</a:t>
+              <a:t>8/27/2016</a:t>
             </a:fld>
             <a:endParaRPr lang="en-US" dirty="0"/>
           </a:p>
@@ -4003,7 +4481,7 @@
             <a:fld id="{B61BEF0D-F0BB-DE4B-95CE-6DB70DBA9567}" type="datetimeFigureOut">
               <a:rPr lang="en-US" dirty="0"/>
               <a:pPr/>
-              <a:t>8/25/2016</a:t>
+              <a:t>8/27/2016</a:t>
             </a:fld>
             <a:endParaRPr lang="en-US" dirty="0"/>
           </a:p>
@@ -4841,7 +5319,7 @@
           <p:nvPr/>
         </p:nvPicPr>
         <p:blipFill>
-          <a:blip r:embed="rId2"/>
+          <a:blip r:embed="rId3"/>
           <a:stretch>
             <a:fillRect/>
           </a:stretch>
@@ -5043,7 +5521,7 @@
             </a:r>
             <a:r>
               <a:rPr lang="en-US" dirty="0"/>
-              <a:t>(“select * from user where username=‘’ OR TRUE; --’ and password=‘???’;</a:t>
+              <a:t>(“select * from user where username=‘’ OR TRUE; -- ’ and password=‘???’;</a:t>
             </a:r>
           </a:p>
           <a:p>
@@ -5057,6 +5535,73 @@
           </a:p>
         </p:txBody>
       </p:sp>
+      <p:sp>
+        <p:nvSpPr>
+          <p:cNvPr id="4" name="TextBox 3"/>
+          <p:cNvSpPr txBox="1"/>
+          <p:nvPr/>
+        </p:nvSpPr>
+        <p:spPr>
+          <a:xfrm>
+            <a:off x="4813160" y="3938954"/>
+            <a:ext cx="7174523" cy="369332"/>
+          </a:xfrm>
+          <a:prstGeom prst="rect">
+            <a:avLst/>
+          </a:prstGeom>
+          <a:noFill/>
+        </p:spPr>
+        <p:txBody>
+          <a:bodyPr wrap="square" rtlCol="0">
+            <a:spAutoFit/>
+          </a:bodyPr>
+          <a:lstStyle/>
+          <a:p>
+            <a:r>
+              <a:rPr lang="en-US" dirty="0"/>
+              <a:t>select * from user where username=‘’ OR TRUE; -- </a:t>
+            </a:r>
+            <a:r>
+              <a:rPr lang="en-US" dirty="0">
+                <a:solidFill>
+                  <a:srgbClr val="FF0000"/>
+                </a:solidFill>
+              </a:rPr>
+              <a:t>‘ AND password = ‘????’;</a:t>
+            </a:r>
+          </a:p>
+        </p:txBody>
+      </p:sp>
+      <p:cxnSp>
+        <p:nvCxnSpPr>
+          <p:cNvPr id="10" name="Straight Connector 9"/>
+          <p:cNvCxnSpPr/>
+          <p:nvPr/>
+        </p:nvCxnSpPr>
+        <p:spPr>
+          <a:xfrm>
+            <a:off x="8400421" y="4391130"/>
+            <a:ext cx="1286190" cy="0"/>
+          </a:xfrm>
+          <a:prstGeom prst="line">
+            <a:avLst/>
+          </a:prstGeom>
+        </p:spPr>
+        <p:style>
+          <a:lnRef idx="3">
+            <a:schemeClr val="accent3"/>
+          </a:lnRef>
+          <a:fillRef idx="0">
+            <a:schemeClr val="accent3"/>
+          </a:fillRef>
+          <a:effectRef idx="2">
+            <a:schemeClr val="accent3"/>
+          </a:effectRef>
+          <a:fontRef idx="minor">
+            <a:schemeClr val="tx1"/>
+          </a:fontRef>
+        </p:style>
+      </p:cxnSp>
     </p:spTree>
     <p:extLst>
       <p:ext uri="{BB962C8B-B14F-4D97-AF65-F5344CB8AC3E}">
@@ -5067,6 +5612,436 @@
   <p:clrMapOvr>
     <a:masterClrMapping/>
   </p:clrMapOvr>
+  <p:timing>
+    <p:tnLst>
+      <p:par>
+        <p:cTn id="1" dur="indefinite" restart="never" nodeType="tmRoot">
+          <p:childTnLst>
+            <p:seq concurrent="1" nextAc="seek">
+              <p:cTn id="2" dur="indefinite" nodeType="mainSeq">
+                <p:childTnLst>
+                  <p:par>
+                    <p:cTn id="3" fill="hold">
+                      <p:stCondLst>
+                        <p:cond delay="indefinite"/>
+                      </p:stCondLst>
+                      <p:childTnLst>
+                        <p:par>
+                          <p:cTn id="4" fill="hold">
+                            <p:stCondLst>
+                              <p:cond delay="0"/>
+                            </p:stCondLst>
+                            <p:childTnLst>
+                              <p:par>
+                                <p:cTn id="5" presetID="1" presetClass="entr" presetSubtype="0" fill="hold" nodeType="clickEffect">
+                                  <p:stCondLst>
+                                    <p:cond delay="0"/>
+                                  </p:stCondLst>
+                                  <p:childTnLst>
+                                    <p:set>
+                                      <p:cBhvr>
+                                        <p:cTn id="6" dur="1" fill="hold">
+                                          <p:stCondLst>
+                                            <p:cond delay="0"/>
+                                          </p:stCondLst>
+                                        </p:cTn>
+                                        <p:tgtEl>
+                                          <p:spTgt spid="3">
+                                            <p:txEl>
+                                              <p:pRg st="2" end="2"/>
+                                            </p:txEl>
+                                          </p:spTgt>
+                                        </p:tgtEl>
+                                        <p:attrNameLst>
+                                          <p:attrName>style.visibility</p:attrName>
+                                        </p:attrNameLst>
+                                      </p:cBhvr>
+                                      <p:to>
+                                        <p:strVal val="visible"/>
+                                      </p:to>
+                                    </p:set>
+                                  </p:childTnLst>
+                                </p:cTn>
+                              </p:par>
+                            </p:childTnLst>
+                          </p:cTn>
+                        </p:par>
+                      </p:childTnLst>
+                    </p:cTn>
+                  </p:par>
+                  <p:par>
+                    <p:cTn id="7" fill="hold">
+                      <p:stCondLst>
+                        <p:cond delay="indefinite"/>
+                      </p:stCondLst>
+                      <p:childTnLst>
+                        <p:par>
+                          <p:cTn id="8" fill="hold">
+                            <p:stCondLst>
+                              <p:cond delay="0"/>
+                            </p:stCondLst>
+                            <p:childTnLst>
+                              <p:par>
+                                <p:cTn id="9" presetID="1" presetClass="entr" presetSubtype="0" fill="hold" nodeType="clickEffect">
+                                  <p:stCondLst>
+                                    <p:cond delay="0"/>
+                                  </p:stCondLst>
+                                  <p:childTnLst>
+                                    <p:set>
+                                      <p:cBhvr>
+                                        <p:cTn id="10" dur="1" fill="hold">
+                                          <p:stCondLst>
+                                            <p:cond delay="0"/>
+                                          </p:stCondLst>
+                                        </p:cTn>
+                                        <p:tgtEl>
+                                          <p:spTgt spid="3">
+                                            <p:txEl>
+                                              <p:pRg st="3" end="3"/>
+                                            </p:txEl>
+                                          </p:spTgt>
+                                        </p:tgtEl>
+                                        <p:attrNameLst>
+                                          <p:attrName>style.visibility</p:attrName>
+                                        </p:attrNameLst>
+                                      </p:cBhvr>
+                                      <p:to>
+                                        <p:strVal val="visible"/>
+                                      </p:to>
+                                    </p:set>
+                                  </p:childTnLst>
+                                </p:cTn>
+                              </p:par>
+                            </p:childTnLst>
+                          </p:cTn>
+                        </p:par>
+                      </p:childTnLst>
+                    </p:cTn>
+                  </p:par>
+                  <p:par>
+                    <p:cTn id="11" fill="hold">
+                      <p:stCondLst>
+                        <p:cond delay="indefinite"/>
+                      </p:stCondLst>
+                      <p:childTnLst>
+                        <p:par>
+                          <p:cTn id="12" fill="hold">
+                            <p:stCondLst>
+                              <p:cond delay="0"/>
+                            </p:stCondLst>
+                            <p:childTnLst>
+                              <p:par>
+                                <p:cTn id="13" presetID="1" presetClass="entr" presetSubtype="0" fill="hold" grpId="0" nodeType="clickEffect">
+                                  <p:stCondLst>
+                                    <p:cond delay="0"/>
+                                  </p:stCondLst>
+                                  <p:childTnLst>
+                                    <p:set>
+                                      <p:cBhvr>
+                                        <p:cTn id="14" dur="1" fill="hold">
+                                          <p:stCondLst>
+                                            <p:cond delay="0"/>
+                                          </p:stCondLst>
+                                        </p:cTn>
+                                        <p:tgtEl>
+                                          <p:spTgt spid="4"/>
+                                        </p:tgtEl>
+                                        <p:attrNameLst>
+                                          <p:attrName>style.visibility</p:attrName>
+                                        </p:attrNameLst>
+                                      </p:cBhvr>
+                                      <p:to>
+                                        <p:strVal val="visible"/>
+                                      </p:to>
+                                    </p:set>
+                                  </p:childTnLst>
+                                </p:cTn>
+                              </p:par>
+                            </p:childTnLst>
+                          </p:cTn>
+                        </p:par>
+                      </p:childTnLst>
+                    </p:cTn>
+                  </p:par>
+                  <p:par>
+                    <p:cTn id="15" fill="hold">
+                      <p:stCondLst>
+                        <p:cond delay="indefinite"/>
+                      </p:stCondLst>
+                      <p:childTnLst>
+                        <p:par>
+                          <p:cTn id="16" fill="hold">
+                            <p:stCondLst>
+                              <p:cond delay="0"/>
+                            </p:stCondLst>
+                            <p:childTnLst>
+                              <p:par>
+                                <p:cTn id="17" presetID="1" presetClass="entr" presetSubtype="0" fill="hold" nodeType="clickEffect">
+                                  <p:stCondLst>
+                                    <p:cond delay="0"/>
+                                  </p:stCondLst>
+                                  <p:childTnLst>
+                                    <p:set>
+                                      <p:cBhvr>
+                                        <p:cTn id="18" dur="1" fill="hold">
+                                          <p:stCondLst>
+                                            <p:cond delay="0"/>
+                                          </p:stCondLst>
+                                        </p:cTn>
+                                        <p:tgtEl>
+                                          <p:spTgt spid="3">
+                                            <p:txEl>
+                                              <p:pRg st="4" end="4"/>
+                                            </p:txEl>
+                                          </p:spTgt>
+                                        </p:tgtEl>
+                                        <p:attrNameLst>
+                                          <p:attrName>style.visibility</p:attrName>
+                                        </p:attrNameLst>
+                                      </p:cBhvr>
+                                      <p:to>
+                                        <p:strVal val="visible"/>
+                                      </p:to>
+                                    </p:set>
+                                  </p:childTnLst>
+                                </p:cTn>
+                              </p:par>
+                            </p:childTnLst>
+                          </p:cTn>
+                        </p:par>
+                      </p:childTnLst>
+                    </p:cTn>
+                  </p:par>
+                  <p:par>
+                    <p:cTn id="19" fill="hold">
+                      <p:stCondLst>
+                        <p:cond delay="indefinite"/>
+                      </p:stCondLst>
+                      <p:childTnLst>
+                        <p:par>
+                          <p:cTn id="20" fill="hold">
+                            <p:stCondLst>
+                              <p:cond delay="0"/>
+                            </p:stCondLst>
+                            <p:childTnLst>
+                              <p:par>
+                                <p:cTn id="21" presetID="1" presetClass="entr" presetSubtype="0" fill="hold" nodeType="clickEffect">
+                                  <p:stCondLst>
+                                    <p:cond delay="0"/>
+                                  </p:stCondLst>
+                                  <p:childTnLst>
+                                    <p:set>
+                                      <p:cBhvr>
+                                        <p:cTn id="22" dur="1" fill="hold">
+                                          <p:stCondLst>
+                                            <p:cond delay="0"/>
+                                          </p:stCondLst>
+                                        </p:cTn>
+                                        <p:tgtEl>
+                                          <p:spTgt spid="10"/>
+                                        </p:tgtEl>
+                                        <p:attrNameLst>
+                                          <p:attrName>style.visibility</p:attrName>
+                                        </p:attrNameLst>
+                                      </p:cBhvr>
+                                      <p:to>
+                                        <p:strVal val="visible"/>
+                                      </p:to>
+                                    </p:set>
+                                  </p:childTnLst>
+                                </p:cTn>
+                              </p:par>
+                            </p:childTnLst>
+                          </p:cTn>
+                        </p:par>
+                      </p:childTnLst>
+                    </p:cTn>
+                  </p:par>
+                  <p:par>
+                    <p:cTn id="23" fill="hold">
+                      <p:stCondLst>
+                        <p:cond delay="indefinite"/>
+                      </p:stCondLst>
+                      <p:childTnLst>
+                        <p:par>
+                          <p:cTn id="24" fill="hold">
+                            <p:stCondLst>
+                              <p:cond delay="0"/>
+                            </p:stCondLst>
+                            <p:childTnLst>
+                              <p:par>
+                                <p:cTn id="25" presetID="1" presetClass="entr" presetSubtype="0" fill="hold" nodeType="clickEffect">
+                                  <p:stCondLst>
+                                    <p:cond delay="0"/>
+                                  </p:stCondLst>
+                                  <p:childTnLst>
+                                    <p:set>
+                                      <p:cBhvr>
+                                        <p:cTn id="26" dur="1" fill="hold">
+                                          <p:stCondLst>
+                                            <p:cond delay="0"/>
+                                          </p:stCondLst>
+                                        </p:cTn>
+                                        <p:tgtEl>
+                                          <p:spTgt spid="3">
+                                            <p:txEl>
+                                              <p:pRg st="5" end="5"/>
+                                            </p:txEl>
+                                          </p:spTgt>
+                                        </p:tgtEl>
+                                        <p:attrNameLst>
+                                          <p:attrName>style.visibility</p:attrName>
+                                        </p:attrNameLst>
+                                      </p:cBhvr>
+                                      <p:to>
+                                        <p:strVal val="visible"/>
+                                      </p:to>
+                                    </p:set>
+                                  </p:childTnLst>
+                                </p:cTn>
+                              </p:par>
+                              <p:par>
+                                <p:cTn id="27" presetID="1" presetClass="entr" presetSubtype="0" fill="hold" nodeType="withEffect">
+                                  <p:stCondLst>
+                                    <p:cond delay="0"/>
+                                  </p:stCondLst>
+                                  <p:childTnLst>
+                                    <p:set>
+                                      <p:cBhvr>
+                                        <p:cTn id="28" dur="1" fill="hold">
+                                          <p:stCondLst>
+                                            <p:cond delay="0"/>
+                                          </p:stCondLst>
+                                        </p:cTn>
+                                        <p:tgtEl>
+                                          <p:spTgt spid="3">
+                                            <p:txEl>
+                                              <p:pRg st="6" end="6"/>
+                                            </p:txEl>
+                                          </p:spTgt>
+                                        </p:tgtEl>
+                                        <p:attrNameLst>
+                                          <p:attrName>style.visibility</p:attrName>
+                                        </p:attrNameLst>
+                                      </p:cBhvr>
+                                      <p:to>
+                                        <p:strVal val="visible"/>
+                                      </p:to>
+                                    </p:set>
+                                  </p:childTnLst>
+                                </p:cTn>
+                              </p:par>
+                            </p:childTnLst>
+                          </p:cTn>
+                        </p:par>
+                      </p:childTnLst>
+                    </p:cTn>
+                  </p:par>
+                  <p:par>
+                    <p:cTn id="29" fill="hold">
+                      <p:stCondLst>
+                        <p:cond delay="indefinite"/>
+                      </p:stCondLst>
+                      <p:childTnLst>
+                        <p:par>
+                          <p:cTn id="30" fill="hold">
+                            <p:stCondLst>
+                              <p:cond delay="0"/>
+                            </p:stCondLst>
+                            <p:childTnLst>
+                              <p:par>
+                                <p:cTn id="31" presetID="1" presetClass="entr" presetSubtype="0" fill="hold" nodeType="clickEffect">
+                                  <p:stCondLst>
+                                    <p:cond delay="0"/>
+                                  </p:stCondLst>
+                                  <p:childTnLst>
+                                    <p:set>
+                                      <p:cBhvr>
+                                        <p:cTn id="32" dur="1" fill="hold">
+                                          <p:stCondLst>
+                                            <p:cond delay="0"/>
+                                          </p:stCondLst>
+                                        </p:cTn>
+                                        <p:tgtEl>
+                                          <p:spTgt spid="3">
+                                            <p:txEl>
+                                              <p:pRg st="7" end="7"/>
+                                            </p:txEl>
+                                          </p:spTgt>
+                                        </p:tgtEl>
+                                        <p:attrNameLst>
+                                          <p:attrName>style.visibility</p:attrName>
+                                        </p:attrNameLst>
+                                      </p:cBhvr>
+                                      <p:to>
+                                        <p:strVal val="visible"/>
+                                      </p:to>
+                                    </p:set>
+                                  </p:childTnLst>
+                                </p:cTn>
+                              </p:par>
+                              <p:par>
+                                <p:cTn id="33" presetID="1" presetClass="entr" presetSubtype="0" fill="hold" nodeType="withEffect">
+                                  <p:stCondLst>
+                                    <p:cond delay="0"/>
+                                  </p:stCondLst>
+                                  <p:childTnLst>
+                                    <p:set>
+                                      <p:cBhvr>
+                                        <p:cTn id="34" dur="1" fill="hold">
+                                          <p:stCondLst>
+                                            <p:cond delay="0"/>
+                                          </p:stCondLst>
+                                        </p:cTn>
+                                        <p:tgtEl>
+                                          <p:spTgt spid="3">
+                                            <p:txEl>
+                                              <p:pRg st="8" end="8"/>
+                                            </p:txEl>
+                                          </p:spTgt>
+                                        </p:tgtEl>
+                                        <p:attrNameLst>
+                                          <p:attrName>style.visibility</p:attrName>
+                                        </p:attrNameLst>
+                                      </p:cBhvr>
+                                      <p:to>
+                                        <p:strVal val="visible"/>
+                                      </p:to>
+                                    </p:set>
+                                  </p:childTnLst>
+                                </p:cTn>
+                              </p:par>
+                            </p:childTnLst>
+                          </p:cTn>
+                        </p:par>
+                      </p:childTnLst>
+                    </p:cTn>
+                  </p:par>
+                </p:childTnLst>
+              </p:cTn>
+              <p:prevCondLst>
+                <p:cond evt="onPrev" delay="0">
+                  <p:tgtEl>
+                    <p:sldTgt/>
+                  </p:tgtEl>
+                </p:cond>
+              </p:prevCondLst>
+              <p:nextCondLst>
+                <p:cond evt="onNext" delay="0">
+                  <p:tgtEl>
+                    <p:sldTgt/>
+                  </p:tgtEl>
+                </p:cond>
+              </p:nextCondLst>
+            </p:seq>
+          </p:childTnLst>
+        </p:cTn>
+      </p:par>
+    </p:tnLst>
+    <p:bldLst>
+      <p:bldP spid="4" grpId="0"/>
+    </p:bldLst>
+  </p:timing>
 </p:sld>
 </file>
 
@@ -5372,6 +6347,423 @@
   <p:clrMapOvr>
     <a:masterClrMapping/>
   </p:clrMapOvr>
+  <p:timing>
+    <p:tnLst>
+      <p:par>
+        <p:cTn id="1" dur="indefinite" restart="never" nodeType="tmRoot">
+          <p:childTnLst>
+            <p:seq concurrent="1" nextAc="seek">
+              <p:cTn id="2" dur="indefinite" nodeType="mainSeq">
+                <p:childTnLst>
+                  <p:par>
+                    <p:cTn id="3" fill="hold">
+                      <p:stCondLst>
+                        <p:cond delay="indefinite"/>
+                      </p:stCondLst>
+                      <p:childTnLst>
+                        <p:par>
+                          <p:cTn id="4" fill="hold">
+                            <p:stCondLst>
+                              <p:cond delay="0"/>
+                            </p:stCondLst>
+                            <p:childTnLst>
+                              <p:par>
+                                <p:cTn id="5" presetID="1" presetClass="entr" presetSubtype="0" fill="hold" grpId="0" nodeType="clickEffect">
+                                  <p:stCondLst>
+                                    <p:cond delay="0"/>
+                                  </p:stCondLst>
+                                  <p:childTnLst>
+                                    <p:set>
+                                      <p:cBhvr>
+                                        <p:cTn id="6" dur="1" fill="hold">
+                                          <p:stCondLst>
+                                            <p:cond delay="0"/>
+                                          </p:stCondLst>
+                                        </p:cTn>
+                                        <p:tgtEl>
+                                          <p:spTgt spid="3">
+                                            <p:txEl>
+                                              <p:pRg st="0" end="0"/>
+                                            </p:txEl>
+                                          </p:spTgt>
+                                        </p:tgtEl>
+                                        <p:attrNameLst>
+                                          <p:attrName>style.visibility</p:attrName>
+                                        </p:attrNameLst>
+                                      </p:cBhvr>
+                                      <p:to>
+                                        <p:strVal val="visible"/>
+                                      </p:to>
+                                    </p:set>
+                                  </p:childTnLst>
+                                </p:cTn>
+                              </p:par>
+                              <p:par>
+                                <p:cTn id="7" presetID="1" presetClass="entr" presetSubtype="0" fill="hold" nodeType="withEffect">
+                                  <p:stCondLst>
+                                    <p:cond delay="0"/>
+                                  </p:stCondLst>
+                                  <p:childTnLst>
+                                    <p:set>
+                                      <p:cBhvr>
+                                        <p:cTn id="8" dur="1" fill="hold">
+                                          <p:stCondLst>
+                                            <p:cond delay="0"/>
+                                          </p:stCondLst>
+                                        </p:cTn>
+                                        <p:tgtEl>
+                                          <p:spTgt spid="4"/>
+                                        </p:tgtEl>
+                                        <p:attrNameLst>
+                                          <p:attrName>style.visibility</p:attrName>
+                                        </p:attrNameLst>
+                                      </p:cBhvr>
+                                      <p:to>
+                                        <p:strVal val="visible"/>
+                                      </p:to>
+                                    </p:set>
+                                  </p:childTnLst>
+                                </p:cTn>
+                              </p:par>
+                            </p:childTnLst>
+                          </p:cTn>
+                        </p:par>
+                      </p:childTnLst>
+                    </p:cTn>
+                  </p:par>
+                  <p:par>
+                    <p:cTn id="9" fill="hold">
+                      <p:stCondLst>
+                        <p:cond delay="indefinite"/>
+                      </p:stCondLst>
+                      <p:childTnLst>
+                        <p:par>
+                          <p:cTn id="10" fill="hold">
+                            <p:stCondLst>
+                              <p:cond delay="0"/>
+                            </p:stCondLst>
+                            <p:childTnLst>
+                              <p:par>
+                                <p:cTn id="11" presetID="1" presetClass="entr" presetSubtype="0" fill="hold" grpId="0" nodeType="clickEffect">
+                                  <p:stCondLst>
+                                    <p:cond delay="0"/>
+                                  </p:stCondLst>
+                                  <p:childTnLst>
+                                    <p:set>
+                                      <p:cBhvr>
+                                        <p:cTn id="12" dur="1" fill="hold">
+                                          <p:stCondLst>
+                                            <p:cond delay="0"/>
+                                          </p:stCondLst>
+                                        </p:cTn>
+                                        <p:tgtEl>
+                                          <p:spTgt spid="3">
+                                            <p:txEl>
+                                              <p:pRg st="1" end="1"/>
+                                            </p:txEl>
+                                          </p:spTgt>
+                                        </p:tgtEl>
+                                        <p:attrNameLst>
+                                          <p:attrName>style.visibility</p:attrName>
+                                        </p:attrNameLst>
+                                      </p:cBhvr>
+                                      <p:to>
+                                        <p:strVal val="visible"/>
+                                      </p:to>
+                                    </p:set>
+                                  </p:childTnLst>
+                                </p:cTn>
+                              </p:par>
+                            </p:childTnLst>
+                          </p:cTn>
+                        </p:par>
+                      </p:childTnLst>
+                    </p:cTn>
+                  </p:par>
+                  <p:par>
+                    <p:cTn id="13" fill="hold">
+                      <p:stCondLst>
+                        <p:cond delay="indefinite"/>
+                      </p:stCondLst>
+                      <p:childTnLst>
+                        <p:par>
+                          <p:cTn id="14" fill="hold">
+                            <p:stCondLst>
+                              <p:cond delay="0"/>
+                            </p:stCondLst>
+                            <p:childTnLst>
+                              <p:par>
+                                <p:cTn id="15" presetID="1" presetClass="entr" presetSubtype="0" fill="hold" nodeType="clickEffect">
+                                  <p:stCondLst>
+                                    <p:cond delay="0"/>
+                                  </p:stCondLst>
+                                  <p:childTnLst>
+                                    <p:set>
+                                      <p:cBhvr>
+                                        <p:cTn id="16" dur="1" fill="hold">
+                                          <p:stCondLst>
+                                            <p:cond delay="0"/>
+                                          </p:stCondLst>
+                                        </p:cTn>
+                                        <p:tgtEl>
+                                          <p:spTgt spid="5"/>
+                                        </p:tgtEl>
+                                        <p:attrNameLst>
+                                          <p:attrName>style.visibility</p:attrName>
+                                        </p:attrNameLst>
+                                      </p:cBhvr>
+                                      <p:to>
+                                        <p:strVal val="visible"/>
+                                      </p:to>
+                                    </p:set>
+                                  </p:childTnLst>
+                                </p:cTn>
+                              </p:par>
+                              <p:par>
+                                <p:cTn id="17" presetID="1" presetClass="entr" presetSubtype="0" fill="hold" grpId="0" nodeType="withEffect">
+                                  <p:stCondLst>
+                                    <p:cond delay="0"/>
+                                  </p:stCondLst>
+                                  <p:childTnLst>
+                                    <p:set>
+                                      <p:cBhvr>
+                                        <p:cTn id="18" dur="1" fill="hold">
+                                          <p:stCondLst>
+                                            <p:cond delay="0"/>
+                                          </p:stCondLst>
+                                        </p:cTn>
+                                        <p:tgtEl>
+                                          <p:spTgt spid="3">
+                                            <p:txEl>
+                                              <p:pRg st="2" end="2"/>
+                                            </p:txEl>
+                                          </p:spTgt>
+                                        </p:tgtEl>
+                                        <p:attrNameLst>
+                                          <p:attrName>style.visibility</p:attrName>
+                                        </p:attrNameLst>
+                                      </p:cBhvr>
+                                      <p:to>
+                                        <p:strVal val="visible"/>
+                                      </p:to>
+                                    </p:set>
+                                  </p:childTnLst>
+                                </p:cTn>
+                              </p:par>
+                            </p:childTnLst>
+                          </p:cTn>
+                        </p:par>
+                      </p:childTnLst>
+                    </p:cTn>
+                  </p:par>
+                  <p:par>
+                    <p:cTn id="19" fill="hold">
+                      <p:stCondLst>
+                        <p:cond delay="indefinite"/>
+                      </p:stCondLst>
+                      <p:childTnLst>
+                        <p:par>
+                          <p:cTn id="20" fill="hold">
+                            <p:stCondLst>
+                              <p:cond delay="0"/>
+                            </p:stCondLst>
+                            <p:childTnLst>
+                              <p:par>
+                                <p:cTn id="21" presetID="1" presetClass="entr" presetSubtype="0" fill="hold" grpId="0" nodeType="clickEffect">
+                                  <p:stCondLst>
+                                    <p:cond delay="0"/>
+                                  </p:stCondLst>
+                                  <p:childTnLst>
+                                    <p:set>
+                                      <p:cBhvr>
+                                        <p:cTn id="22" dur="1" fill="hold">
+                                          <p:stCondLst>
+                                            <p:cond delay="0"/>
+                                          </p:stCondLst>
+                                        </p:cTn>
+                                        <p:tgtEl>
+                                          <p:spTgt spid="3">
+                                            <p:txEl>
+                                              <p:pRg st="3" end="3"/>
+                                            </p:txEl>
+                                          </p:spTgt>
+                                        </p:tgtEl>
+                                        <p:attrNameLst>
+                                          <p:attrName>style.visibility</p:attrName>
+                                        </p:attrNameLst>
+                                      </p:cBhvr>
+                                      <p:to>
+                                        <p:strVal val="visible"/>
+                                      </p:to>
+                                    </p:set>
+                                  </p:childTnLst>
+                                </p:cTn>
+                              </p:par>
+                            </p:childTnLst>
+                          </p:cTn>
+                        </p:par>
+                        <p:par>
+                          <p:cTn id="23" fill="hold">
+                            <p:stCondLst>
+                              <p:cond delay="0"/>
+                            </p:stCondLst>
+                            <p:childTnLst>
+                              <p:par>
+                                <p:cTn id="24" presetID="1" presetClass="entr" presetSubtype="0" fill="hold" nodeType="afterEffect">
+                                  <p:stCondLst>
+                                    <p:cond delay="0"/>
+                                  </p:stCondLst>
+                                  <p:childTnLst>
+                                    <p:set>
+                                      <p:cBhvr>
+                                        <p:cTn id="25" dur="1" fill="hold">
+                                          <p:stCondLst>
+                                            <p:cond delay="0"/>
+                                          </p:stCondLst>
+                                        </p:cTn>
+                                        <p:tgtEl>
+                                          <p:spTgt spid="6"/>
+                                        </p:tgtEl>
+                                        <p:attrNameLst>
+                                          <p:attrName>style.visibility</p:attrName>
+                                        </p:attrNameLst>
+                                      </p:cBhvr>
+                                      <p:to>
+                                        <p:strVal val="visible"/>
+                                      </p:to>
+                                    </p:set>
+                                  </p:childTnLst>
+                                </p:cTn>
+                              </p:par>
+                            </p:childTnLst>
+                          </p:cTn>
+                        </p:par>
+                      </p:childTnLst>
+                    </p:cTn>
+                  </p:par>
+                  <p:par>
+                    <p:cTn id="26" fill="hold">
+                      <p:stCondLst>
+                        <p:cond delay="indefinite"/>
+                      </p:stCondLst>
+                      <p:childTnLst>
+                        <p:par>
+                          <p:cTn id="27" fill="hold">
+                            <p:stCondLst>
+                              <p:cond delay="0"/>
+                            </p:stCondLst>
+                            <p:childTnLst>
+                              <p:par>
+                                <p:cTn id="28" presetID="1" presetClass="entr" presetSubtype="0" fill="hold" grpId="0" nodeType="clickEffect">
+                                  <p:stCondLst>
+                                    <p:cond delay="0"/>
+                                  </p:stCondLst>
+                                  <p:childTnLst>
+                                    <p:set>
+                                      <p:cBhvr>
+                                        <p:cTn id="29" dur="1" fill="hold">
+                                          <p:stCondLst>
+                                            <p:cond delay="0"/>
+                                          </p:stCondLst>
+                                        </p:cTn>
+                                        <p:tgtEl>
+                                          <p:spTgt spid="3">
+                                            <p:txEl>
+                                              <p:pRg st="11" end="11"/>
+                                            </p:txEl>
+                                          </p:spTgt>
+                                        </p:tgtEl>
+                                        <p:attrNameLst>
+                                          <p:attrName>style.visibility</p:attrName>
+                                        </p:attrNameLst>
+                                      </p:cBhvr>
+                                      <p:to>
+                                        <p:strVal val="visible"/>
+                                      </p:to>
+                                    </p:set>
+                                  </p:childTnLst>
+                                </p:cTn>
+                              </p:par>
+                            </p:childTnLst>
+                          </p:cTn>
+                        </p:par>
+                      </p:childTnLst>
+                    </p:cTn>
+                  </p:par>
+                  <p:par>
+                    <p:cTn id="30" fill="hold">
+                      <p:stCondLst>
+                        <p:cond delay="indefinite"/>
+                      </p:stCondLst>
+                      <p:childTnLst>
+                        <p:par>
+                          <p:cTn id="31" fill="hold">
+                            <p:stCondLst>
+                              <p:cond delay="0"/>
+                            </p:stCondLst>
+                            <p:childTnLst>
+                              <p:par>
+                                <p:cTn id="32" presetID="1" presetClass="entr" presetSubtype="0" fill="hold" grpId="0" nodeType="clickEffect">
+                                  <p:stCondLst>
+                                    <p:cond delay="0"/>
+                                  </p:stCondLst>
+                                  <p:childTnLst>
+                                    <p:set>
+                                      <p:cBhvr>
+                                        <p:cTn id="33" dur="1" fill="hold">
+                                          <p:stCondLst>
+                                            <p:cond delay="0"/>
+                                          </p:stCondLst>
+                                        </p:cTn>
+                                        <p:tgtEl>
+                                          <p:spTgt spid="3">
+                                            <p:txEl>
+                                              <p:pRg st="12" end="12"/>
+                                            </p:txEl>
+                                          </p:spTgt>
+                                        </p:tgtEl>
+                                        <p:attrNameLst>
+                                          <p:attrName>style.visibility</p:attrName>
+                                        </p:attrNameLst>
+                                      </p:cBhvr>
+                                      <p:to>
+                                        <p:strVal val="visible"/>
+                                      </p:to>
+                                    </p:set>
+                                  </p:childTnLst>
+                                </p:cTn>
+                              </p:par>
+                            </p:childTnLst>
+                          </p:cTn>
+                        </p:par>
+                      </p:childTnLst>
+                    </p:cTn>
+                  </p:par>
+                </p:childTnLst>
+              </p:cTn>
+              <p:prevCondLst>
+                <p:cond evt="onPrev" delay="0">
+                  <p:tgtEl>
+                    <p:sldTgt/>
+                  </p:tgtEl>
+                </p:cond>
+              </p:prevCondLst>
+              <p:nextCondLst>
+                <p:cond evt="onNext" delay="0">
+                  <p:tgtEl>
+                    <p:sldTgt/>
+                  </p:tgtEl>
+                </p:cond>
+              </p:nextCondLst>
+            </p:seq>
+          </p:childTnLst>
+        </p:cTn>
+      </p:par>
+    </p:tnLst>
+    <p:bldLst>
+      <p:bldP spid="3" grpId="0" uiExpand="1" build="p"/>
+    </p:bldLst>
+  </p:timing>
 </p:sld>
 </file>
 
@@ -5501,6 +6893,81 @@
   <p:clrMapOvr>
     <a:masterClrMapping/>
   </p:clrMapOvr>
+  <p:timing>
+    <p:tnLst>
+      <p:par>
+        <p:cTn id="1" dur="indefinite" restart="never" nodeType="tmRoot">
+          <p:childTnLst>
+            <p:seq concurrent="1" nextAc="seek">
+              <p:cTn id="2" dur="indefinite" nodeType="mainSeq">
+                <p:childTnLst>
+                  <p:par>
+                    <p:cTn id="3" fill="hold">
+                      <p:stCondLst>
+                        <p:cond delay="indefinite"/>
+                      </p:stCondLst>
+                      <p:childTnLst>
+                        <p:par>
+                          <p:cTn id="4" fill="hold">
+                            <p:stCondLst>
+                              <p:cond delay="0"/>
+                            </p:stCondLst>
+                            <p:childTnLst>
+                              <p:par>
+                                <p:cTn id="5" presetID="1" presetClass="entr" presetSubtype="0" fill="hold" nodeType="clickEffect">
+                                  <p:stCondLst>
+                                    <p:cond delay="0"/>
+                                  </p:stCondLst>
+                                  <p:childTnLst>
+                                    <p:set>
+                                      <p:cBhvr>
+                                        <p:cTn id="6" dur="1" fill="hold">
+                                          <p:stCondLst>
+                                            <p:cond delay="0"/>
+                                          </p:stCondLst>
+                                        </p:cTn>
+                                        <p:tgtEl>
+                                          <p:spTgt spid="1026"/>
+                                        </p:tgtEl>
+                                        <p:attrNameLst>
+                                          <p:attrName>style.visibility</p:attrName>
+                                        </p:attrNameLst>
+                                      </p:cBhvr>
+                                      <p:to>
+                                        <p:strVal val="visible"/>
+                                      </p:to>
+                                    </p:set>
+                                  </p:childTnLst>
+                                </p:cTn>
+                              </p:par>
+                            </p:childTnLst>
+                          </p:cTn>
+                        </p:par>
+                      </p:childTnLst>
+                    </p:cTn>
+                  </p:par>
+                </p:childTnLst>
+              </p:cTn>
+              <p:prevCondLst>
+                <p:cond evt="onPrev" delay="0">
+                  <p:tgtEl>
+                    <p:sldTgt/>
+                  </p:tgtEl>
+                </p:cond>
+              </p:prevCondLst>
+              <p:nextCondLst>
+                <p:cond evt="onNext" delay="0">
+                  <p:tgtEl>
+                    <p:sldTgt/>
+                  </p:tgtEl>
+                </p:cond>
+              </p:nextCondLst>
+            </p:seq>
+          </p:childTnLst>
+        </p:cTn>
+      </p:par>
+    </p:tnLst>
+  </p:timing>
 </p:sld>
 </file>
 
@@ -5624,8 +7091,10 @@
             <a:endParaRPr lang="en-US" dirty="0"/>
           </a:p>
           <a:p>
-            <a:pPr lvl="1"/>
-            <a:endParaRPr lang="en-US" dirty="0"/>
+            <a:r>
+              <a:rPr lang="en-US" dirty="0"/>
+              <a:t>8 letter username takes ~56 requests</a:t>
+            </a:r>
           </a:p>
         </p:txBody>
       </p:sp>
@@ -5639,6 +7108,267 @@
   <p:clrMapOvr>
     <a:masterClrMapping/>
   </p:clrMapOvr>
+  <p:timing>
+    <p:tnLst>
+      <p:par>
+        <p:cTn id="1" dur="indefinite" restart="never" nodeType="tmRoot">
+          <p:childTnLst>
+            <p:seq concurrent="1" nextAc="seek">
+              <p:cTn id="2" dur="indefinite" nodeType="mainSeq">
+                <p:childTnLst>
+                  <p:par>
+                    <p:cTn id="3" fill="hold">
+                      <p:stCondLst>
+                        <p:cond delay="indefinite"/>
+                      </p:stCondLst>
+                      <p:childTnLst>
+                        <p:par>
+                          <p:cTn id="4" fill="hold">
+                            <p:stCondLst>
+                              <p:cond delay="0"/>
+                            </p:stCondLst>
+                            <p:childTnLst>
+                              <p:par>
+                                <p:cTn id="5" presetID="1" presetClass="entr" presetSubtype="0" fill="hold" nodeType="clickEffect">
+                                  <p:stCondLst>
+                                    <p:cond delay="0"/>
+                                  </p:stCondLst>
+                                  <p:childTnLst>
+                                    <p:set>
+                                      <p:cBhvr>
+                                        <p:cTn id="6" dur="1" fill="hold">
+                                          <p:stCondLst>
+                                            <p:cond delay="0"/>
+                                          </p:stCondLst>
+                                        </p:cTn>
+                                        <p:tgtEl>
+                                          <p:spTgt spid="3">
+                                            <p:txEl>
+                                              <p:pRg st="2" end="2"/>
+                                            </p:txEl>
+                                          </p:spTgt>
+                                        </p:tgtEl>
+                                        <p:attrNameLst>
+                                          <p:attrName>style.visibility</p:attrName>
+                                        </p:attrNameLst>
+                                      </p:cBhvr>
+                                      <p:to>
+                                        <p:strVal val="visible"/>
+                                      </p:to>
+                                    </p:set>
+                                  </p:childTnLst>
+                                </p:cTn>
+                              </p:par>
+                              <p:par>
+                                <p:cTn id="7" presetID="1" presetClass="entr" presetSubtype="0" fill="hold" nodeType="withEffect">
+                                  <p:stCondLst>
+                                    <p:cond delay="0"/>
+                                  </p:stCondLst>
+                                  <p:childTnLst>
+                                    <p:set>
+                                      <p:cBhvr>
+                                        <p:cTn id="8" dur="1" fill="hold">
+                                          <p:stCondLst>
+                                            <p:cond delay="0"/>
+                                          </p:stCondLst>
+                                        </p:cTn>
+                                        <p:tgtEl>
+                                          <p:spTgt spid="3">
+                                            <p:txEl>
+                                              <p:pRg st="3" end="3"/>
+                                            </p:txEl>
+                                          </p:spTgt>
+                                        </p:tgtEl>
+                                        <p:attrNameLst>
+                                          <p:attrName>style.visibility</p:attrName>
+                                        </p:attrNameLst>
+                                      </p:cBhvr>
+                                      <p:to>
+                                        <p:strVal val="visible"/>
+                                      </p:to>
+                                    </p:set>
+                                  </p:childTnLst>
+                                </p:cTn>
+                              </p:par>
+                            </p:childTnLst>
+                          </p:cTn>
+                        </p:par>
+                      </p:childTnLst>
+                    </p:cTn>
+                  </p:par>
+                  <p:par>
+                    <p:cTn id="9" fill="hold">
+                      <p:stCondLst>
+                        <p:cond delay="indefinite"/>
+                      </p:stCondLst>
+                      <p:childTnLst>
+                        <p:par>
+                          <p:cTn id="10" fill="hold">
+                            <p:stCondLst>
+                              <p:cond delay="0"/>
+                            </p:stCondLst>
+                            <p:childTnLst>
+                              <p:par>
+                                <p:cTn id="11" presetID="1" presetClass="entr" presetSubtype="0" fill="hold" nodeType="clickEffect">
+                                  <p:stCondLst>
+                                    <p:cond delay="0"/>
+                                  </p:stCondLst>
+                                  <p:childTnLst>
+                                    <p:set>
+                                      <p:cBhvr>
+                                        <p:cTn id="12" dur="1" fill="hold">
+                                          <p:stCondLst>
+                                            <p:cond delay="0"/>
+                                          </p:stCondLst>
+                                        </p:cTn>
+                                        <p:tgtEl>
+                                          <p:spTgt spid="3">
+                                            <p:txEl>
+                                              <p:pRg st="4" end="4"/>
+                                            </p:txEl>
+                                          </p:spTgt>
+                                        </p:tgtEl>
+                                        <p:attrNameLst>
+                                          <p:attrName>style.visibility</p:attrName>
+                                        </p:attrNameLst>
+                                      </p:cBhvr>
+                                      <p:to>
+                                        <p:strVal val="visible"/>
+                                      </p:to>
+                                    </p:set>
+                                  </p:childTnLst>
+                                </p:cTn>
+                              </p:par>
+                              <p:par>
+                                <p:cTn id="13" presetID="1" presetClass="entr" presetSubtype="0" fill="hold" nodeType="withEffect">
+                                  <p:stCondLst>
+                                    <p:cond delay="0"/>
+                                  </p:stCondLst>
+                                  <p:childTnLst>
+                                    <p:set>
+                                      <p:cBhvr>
+                                        <p:cTn id="14" dur="1" fill="hold">
+                                          <p:stCondLst>
+                                            <p:cond delay="0"/>
+                                          </p:stCondLst>
+                                        </p:cTn>
+                                        <p:tgtEl>
+                                          <p:spTgt spid="3">
+                                            <p:txEl>
+                                              <p:pRg st="5" end="5"/>
+                                            </p:txEl>
+                                          </p:spTgt>
+                                        </p:tgtEl>
+                                        <p:attrNameLst>
+                                          <p:attrName>style.visibility</p:attrName>
+                                        </p:attrNameLst>
+                                      </p:cBhvr>
+                                      <p:to>
+                                        <p:strVal val="visible"/>
+                                      </p:to>
+                                    </p:set>
+                                  </p:childTnLst>
+                                </p:cTn>
+                              </p:par>
+                              <p:par>
+                                <p:cTn id="15" presetID="1" presetClass="entr" presetSubtype="0" fill="hold" nodeType="withEffect">
+                                  <p:stCondLst>
+                                    <p:cond delay="0"/>
+                                  </p:stCondLst>
+                                  <p:childTnLst>
+                                    <p:set>
+                                      <p:cBhvr>
+                                        <p:cTn id="16" dur="1" fill="hold">
+                                          <p:stCondLst>
+                                            <p:cond delay="0"/>
+                                          </p:stCondLst>
+                                        </p:cTn>
+                                        <p:tgtEl>
+                                          <p:spTgt spid="3">
+                                            <p:txEl>
+                                              <p:pRg st="6" end="6"/>
+                                            </p:txEl>
+                                          </p:spTgt>
+                                        </p:tgtEl>
+                                        <p:attrNameLst>
+                                          <p:attrName>style.visibility</p:attrName>
+                                        </p:attrNameLst>
+                                      </p:cBhvr>
+                                      <p:to>
+                                        <p:strVal val="visible"/>
+                                      </p:to>
+                                    </p:set>
+                                  </p:childTnLst>
+                                </p:cTn>
+                              </p:par>
+                            </p:childTnLst>
+                          </p:cTn>
+                        </p:par>
+                        <p:par>
+                          <p:cTn id="17" fill="hold">
+                            <p:stCondLst>
+                              <p:cond delay="0"/>
+                            </p:stCondLst>
+                            <p:childTnLst>
+                              <p:par>
+                                <p:cTn id="18" presetID="1" presetClass="entr" presetSubtype="0" fill="hold" nodeType="afterEffect">
+                                  <p:stCondLst>
+                                    <p:cond delay="0"/>
+                                  </p:stCondLst>
+                                  <p:childTnLst>
+                                    <p:set>
+                                      <p:cBhvr>
+                                        <p:cTn id="19" dur="1" fill="hold">
+                                          <p:stCondLst>
+                                            <p:cond delay="0"/>
+                                          </p:stCondLst>
+                                        </p:cTn>
+                                        <p:tgtEl>
+                                          <p:spTgt spid="3">
+                                            <p:txEl>
+                                              <p:pRg st="7" end="7"/>
+                                            </p:txEl>
+                                          </p:spTgt>
+                                        </p:tgtEl>
+                                        <p:attrNameLst>
+                                          <p:attrName>style.visibility</p:attrName>
+                                        </p:attrNameLst>
+                                      </p:cBhvr>
+                                      <p:to>
+                                        <p:strVal val="visible"/>
+                                      </p:to>
+                                    </p:set>
+                                  </p:childTnLst>
+                                </p:cTn>
+                              </p:par>
+                            </p:childTnLst>
+                          </p:cTn>
+                        </p:par>
+                      </p:childTnLst>
+                    </p:cTn>
+                  </p:par>
+                </p:childTnLst>
+              </p:cTn>
+              <p:prevCondLst>
+                <p:cond evt="onPrev" delay="0">
+                  <p:tgtEl>
+                    <p:sldTgt/>
+                  </p:tgtEl>
+                </p:cond>
+              </p:prevCondLst>
+              <p:nextCondLst>
+                <p:cond evt="onNext" delay="0">
+                  <p:tgtEl>
+                    <p:sldTgt/>
+                  </p:tgtEl>
+                </p:cond>
+              </p:nextCondLst>
+            </p:seq>
+          </p:childTnLst>
+        </p:cTn>
+      </p:par>
+    </p:tnLst>
+  </p:timing>
 </p:sld>
 </file>
 
@@ -5777,10 +7507,18 @@
         </p:nvSpPr>
         <p:spPr/>
         <p:txBody>
-          <a:bodyPr/>
+          <a:bodyPr>
+            <a:normAutofit/>
+          </a:bodyPr>
           <a:lstStyle/>
           <a:p>
-            <a:endParaRPr lang="en-US" dirty="0"/>
+            <a:pPr marL="0" indent="0">
+              <a:buNone/>
+            </a:pPr>
+            <a:r>
+              <a:rPr lang="en-US" sz="4400" dirty="0"/>
+              <a:t>http://web2014.picoctf.com/injection4/</a:t>
+            </a:r>
           </a:p>
         </p:txBody>
       </p:sp>
@@ -6072,30 +7810,78 @@
             <p:ph idx="1"/>
           </p:nvPr>
         </p:nvSpPr>
-        <p:spPr/>
-        <p:txBody>
-          <a:bodyPr/>
+        <p:spPr>
+          <a:xfrm>
+            <a:off x="2736563" y="2087190"/>
+            <a:ext cx="11029615" cy="3678303"/>
+          </a:xfrm>
+        </p:spPr>
+        <p:txBody>
+          <a:bodyPr>
+            <a:normAutofit/>
+          </a:bodyPr>
           <a:lstStyle/>
           <a:p>
             <a:r>
-              <a:rPr lang="en-US" dirty="0"/>
+              <a:rPr lang="en-US" sz="3600" dirty="0"/>
               <a:t>Simple</a:t>
             </a:r>
           </a:p>
           <a:p>
             <a:r>
-              <a:rPr lang="en-US" dirty="0"/>
+              <a:rPr lang="en-US" sz="3600" dirty="0"/>
               <a:t>Error based</a:t>
             </a:r>
           </a:p>
           <a:p>
             <a:r>
-              <a:rPr lang="en-US" dirty="0"/>
+              <a:rPr lang="en-US" sz="3600" dirty="0"/>
               <a:t>Blind</a:t>
             </a:r>
           </a:p>
         </p:txBody>
       </p:sp>
+      <p:pic>
+        <p:nvPicPr>
+          <p:cNvPr id="1026" name="Picture 2" descr="http://www.mobafire.com/images/champion/icon/lee-sin.png"/>
+          <p:cNvPicPr>
+            <a:picLocks noChangeAspect="1" noChangeArrowheads="1"/>
+          </p:cNvPicPr>
+          <p:nvPr/>
+        </p:nvPicPr>
+        <p:blipFill>
+          <a:blip r:embed="rId3">
+            <a:extLst>
+              <a:ext uri="{28A0092B-C50C-407E-A947-70E740481C1C}">
+                <a14:useLocalDpi xmlns:a14="http://schemas.microsoft.com/office/drawing/2010/main" val="0"/>
+              </a:ext>
+            </a:extLst>
+          </a:blip>
+          <a:srcRect/>
+          <a:stretch>
+            <a:fillRect/>
+          </a:stretch>
+        </p:blipFill>
+        <p:spPr bwMode="auto">
+          <a:xfrm>
+            <a:off x="4363680" y="4410220"/>
+            <a:ext cx="1143000" cy="1143001"/>
+          </a:xfrm>
+          <a:prstGeom prst="rect">
+            <a:avLst/>
+          </a:prstGeom>
+          <a:noFill/>
+          <a:extLst>
+            <a:ext uri="{909E8E84-426E-40DD-AFC4-6F175D3DCCD1}">
+              <a14:hiddenFill xmlns:a14="http://schemas.microsoft.com/office/drawing/2010/main">
+                <a:solidFill>
+                  <a:srgbClr val="FFFFFF"/>
+                </a:solidFill>
+              </a14:hiddenFill>
+            </a:ext>
+          </a:extLst>
+        </p:spPr>
+      </p:pic>
     </p:spTree>
     <p:extLst>
       <p:ext uri="{BB962C8B-B14F-4D97-AF65-F5344CB8AC3E}">
@@ -6106,6 +7892,213 @@
   <p:clrMapOvr>
     <a:masterClrMapping/>
   </p:clrMapOvr>
+  <p:timing>
+    <p:tnLst>
+      <p:par>
+        <p:cTn id="1" dur="indefinite" restart="never" nodeType="tmRoot">
+          <p:childTnLst>
+            <p:seq concurrent="1" nextAc="seek">
+              <p:cTn id="2" dur="indefinite" nodeType="mainSeq">
+                <p:childTnLst>
+                  <p:par>
+                    <p:cTn id="3" fill="hold">
+                      <p:stCondLst>
+                        <p:cond delay="indefinite"/>
+                      </p:stCondLst>
+                      <p:childTnLst>
+                        <p:par>
+                          <p:cTn id="4" fill="hold">
+                            <p:stCondLst>
+                              <p:cond delay="0"/>
+                            </p:stCondLst>
+                            <p:childTnLst>
+                              <p:par>
+                                <p:cTn id="5" presetID="1" presetClass="entr" presetSubtype="0" fill="hold" grpId="0" nodeType="clickEffect">
+                                  <p:stCondLst>
+                                    <p:cond delay="0"/>
+                                  </p:stCondLst>
+                                  <p:childTnLst>
+                                    <p:set>
+                                      <p:cBhvr>
+                                        <p:cTn id="6" dur="1" fill="hold">
+                                          <p:stCondLst>
+                                            <p:cond delay="0"/>
+                                          </p:stCondLst>
+                                        </p:cTn>
+                                        <p:tgtEl>
+                                          <p:spTgt spid="3">
+                                            <p:txEl>
+                                              <p:pRg st="0" end="0"/>
+                                            </p:txEl>
+                                          </p:spTgt>
+                                        </p:tgtEl>
+                                        <p:attrNameLst>
+                                          <p:attrName>style.visibility</p:attrName>
+                                        </p:attrNameLst>
+                                      </p:cBhvr>
+                                      <p:to>
+                                        <p:strVal val="visible"/>
+                                      </p:to>
+                                    </p:set>
+                                  </p:childTnLst>
+                                </p:cTn>
+                              </p:par>
+                            </p:childTnLst>
+                          </p:cTn>
+                        </p:par>
+                      </p:childTnLst>
+                    </p:cTn>
+                  </p:par>
+                  <p:par>
+                    <p:cTn id="7" fill="hold">
+                      <p:stCondLst>
+                        <p:cond delay="indefinite"/>
+                      </p:stCondLst>
+                      <p:childTnLst>
+                        <p:par>
+                          <p:cTn id="8" fill="hold">
+                            <p:stCondLst>
+                              <p:cond delay="0"/>
+                            </p:stCondLst>
+                            <p:childTnLst>
+                              <p:par>
+                                <p:cTn id="9" presetID="1" presetClass="entr" presetSubtype="0" fill="hold" grpId="0" nodeType="clickEffect">
+                                  <p:stCondLst>
+                                    <p:cond delay="0"/>
+                                  </p:stCondLst>
+                                  <p:childTnLst>
+                                    <p:set>
+                                      <p:cBhvr>
+                                        <p:cTn id="10" dur="1" fill="hold">
+                                          <p:stCondLst>
+                                            <p:cond delay="0"/>
+                                          </p:stCondLst>
+                                        </p:cTn>
+                                        <p:tgtEl>
+                                          <p:spTgt spid="3">
+                                            <p:txEl>
+                                              <p:pRg st="1" end="1"/>
+                                            </p:txEl>
+                                          </p:spTgt>
+                                        </p:tgtEl>
+                                        <p:attrNameLst>
+                                          <p:attrName>style.visibility</p:attrName>
+                                        </p:attrNameLst>
+                                      </p:cBhvr>
+                                      <p:to>
+                                        <p:strVal val="visible"/>
+                                      </p:to>
+                                    </p:set>
+                                  </p:childTnLst>
+                                </p:cTn>
+                              </p:par>
+                            </p:childTnLst>
+                          </p:cTn>
+                        </p:par>
+                      </p:childTnLst>
+                    </p:cTn>
+                  </p:par>
+                  <p:par>
+                    <p:cTn id="11" fill="hold">
+                      <p:stCondLst>
+                        <p:cond delay="indefinite"/>
+                      </p:stCondLst>
+                      <p:childTnLst>
+                        <p:par>
+                          <p:cTn id="12" fill="hold">
+                            <p:stCondLst>
+                              <p:cond delay="0"/>
+                            </p:stCondLst>
+                            <p:childTnLst>
+                              <p:par>
+                                <p:cTn id="13" presetID="1" presetClass="entr" presetSubtype="0" fill="hold" grpId="0" nodeType="clickEffect">
+                                  <p:stCondLst>
+                                    <p:cond delay="0"/>
+                                  </p:stCondLst>
+                                  <p:childTnLst>
+                                    <p:set>
+                                      <p:cBhvr>
+                                        <p:cTn id="14" dur="1" fill="hold">
+                                          <p:stCondLst>
+                                            <p:cond delay="0"/>
+                                          </p:stCondLst>
+                                        </p:cTn>
+                                        <p:tgtEl>
+                                          <p:spTgt spid="3">
+                                            <p:txEl>
+                                              <p:pRg st="2" end="2"/>
+                                            </p:txEl>
+                                          </p:spTgt>
+                                        </p:tgtEl>
+                                        <p:attrNameLst>
+                                          <p:attrName>style.visibility</p:attrName>
+                                        </p:attrNameLst>
+                                      </p:cBhvr>
+                                      <p:to>
+                                        <p:strVal val="visible"/>
+                                      </p:to>
+                                    </p:set>
+                                  </p:childTnLst>
+                                </p:cTn>
+                              </p:par>
+                              <p:par>
+                                <p:cTn id="15" presetID="1" presetClass="entr" presetSubtype="0" fill="hold" nodeType="withEffect">
+                                  <p:stCondLst>
+                                    <p:cond delay="0"/>
+                                  </p:stCondLst>
+                                  <p:childTnLst>
+                                    <p:set>
+                                      <p:cBhvr>
+                                        <p:cTn id="16" dur="1" fill="hold">
+                                          <p:stCondLst>
+                                            <p:cond delay="0"/>
+                                          </p:stCondLst>
+                                        </p:cTn>
+                                        <p:tgtEl>
+                                          <p:spTgt spid="1026"/>
+                                        </p:tgtEl>
+                                        <p:attrNameLst>
+                                          <p:attrName>style.visibility</p:attrName>
+                                        </p:attrNameLst>
+                                      </p:cBhvr>
+                                      <p:to>
+                                        <p:strVal val="visible"/>
+                                      </p:to>
+                                    </p:set>
+                                  </p:childTnLst>
+                                </p:cTn>
+                              </p:par>
+                            </p:childTnLst>
+                          </p:cTn>
+                        </p:par>
+                      </p:childTnLst>
+                    </p:cTn>
+                  </p:par>
+                </p:childTnLst>
+              </p:cTn>
+              <p:prevCondLst>
+                <p:cond evt="onPrev" delay="0">
+                  <p:tgtEl>
+                    <p:sldTgt/>
+                  </p:tgtEl>
+                </p:cond>
+              </p:prevCondLst>
+              <p:nextCondLst>
+                <p:cond evt="onNext" delay="0">
+                  <p:tgtEl>
+                    <p:sldTgt/>
+                  </p:tgtEl>
+                </p:cond>
+              </p:nextCondLst>
+            </p:seq>
+          </p:childTnLst>
+        </p:cTn>
+      </p:par>
+    </p:tnLst>
+    <p:bldLst>
+      <p:bldP spid="3" grpId="0" build="p"/>
+    </p:bldLst>
+  </p:timing>
 </p:sld>
 </file>
 
@@ -6143,6 +8136,495 @@
           <a:p>
             <a:r>
               <a:rPr lang="en-US" dirty="0"/>
+              <a:t>SQL injection is a very common attack</a:t>
+            </a:r>
+          </a:p>
+        </p:txBody>
+      </p:sp>
+      <p:sp>
+        <p:nvSpPr>
+          <p:cNvPr id="3" name="Content Placeholder 2"/>
+          <p:cNvSpPr>
+            <a:spLocks noGrp="1"/>
+          </p:cNvSpPr>
+          <p:nvPr>
+            <p:ph idx="1"/>
+          </p:nvPr>
+        </p:nvSpPr>
+        <p:spPr/>
+        <p:txBody>
+          <a:bodyPr/>
+          <a:lstStyle/>
+          <a:p>
+            <a:r>
+              <a:rPr lang="en-US" dirty="0"/>
+              <a:t>Oracle</a:t>
+            </a:r>
+          </a:p>
+          <a:p>
+            <a:r>
+              <a:rPr lang="en-US" dirty="0" err="1"/>
+              <a:t>MySpace</a:t>
+            </a:r>
+            <a:endParaRPr lang="en-US" dirty="0"/>
+          </a:p>
+          <a:p>
+            <a:r>
+              <a:rPr lang="en-US" dirty="0"/>
+              <a:t>LinkedIn</a:t>
+            </a:r>
+          </a:p>
+          <a:p>
+            <a:r>
+              <a:rPr lang="en-US" dirty="0"/>
+              <a:t>JP Morgan</a:t>
+            </a:r>
+          </a:p>
+          <a:p>
+            <a:r>
+              <a:rPr lang="en-US" dirty="0"/>
+              <a:t>Ashley Madison</a:t>
+            </a:r>
+          </a:p>
+          <a:p>
+            <a:r>
+              <a:rPr lang="en-US" dirty="0"/>
+              <a:t>Sony</a:t>
+            </a:r>
+          </a:p>
+          <a:p>
+            <a:r>
+              <a:rPr lang="en-US" dirty="0"/>
+              <a:t>Any time you read in the news “x million usernames and passwords stolen from ____”, it was probably </a:t>
+            </a:r>
+            <a:r>
+              <a:rPr lang="en-US" dirty="0" err="1"/>
+              <a:t>SQLi</a:t>
+            </a:r>
+            <a:endParaRPr lang="en-US" dirty="0"/>
+          </a:p>
+        </p:txBody>
+      </p:sp>
+    </p:spTree>
+    <p:extLst>
+      <p:ext uri="{BB962C8B-B14F-4D97-AF65-F5344CB8AC3E}">
+        <p14:creationId xmlns:p14="http://schemas.microsoft.com/office/powerpoint/2010/main" val="55138950"/>
+      </p:ext>
+    </p:extLst>
+  </p:cSld>
+  <p:clrMapOvr>
+    <a:masterClrMapping/>
+  </p:clrMapOvr>
+  <p:timing>
+    <p:tnLst>
+      <p:par>
+        <p:cTn id="1" dur="indefinite" restart="never" nodeType="tmRoot">
+          <p:childTnLst>
+            <p:seq concurrent="1" nextAc="seek">
+              <p:cTn id="2" dur="indefinite" nodeType="mainSeq">
+                <p:childTnLst>
+                  <p:par>
+                    <p:cTn id="3" fill="hold">
+                      <p:stCondLst>
+                        <p:cond delay="indefinite"/>
+                      </p:stCondLst>
+                      <p:childTnLst>
+                        <p:par>
+                          <p:cTn id="4" fill="hold">
+                            <p:stCondLst>
+                              <p:cond delay="0"/>
+                            </p:stCondLst>
+                            <p:childTnLst>
+                              <p:par>
+                                <p:cTn id="5" presetID="1" presetClass="entr" presetSubtype="0" fill="hold" nodeType="clickEffect">
+                                  <p:stCondLst>
+                                    <p:cond delay="0"/>
+                                  </p:stCondLst>
+                                  <p:childTnLst>
+                                    <p:set>
+                                      <p:cBhvr>
+                                        <p:cTn id="6" dur="1" fill="hold">
+                                          <p:stCondLst>
+                                            <p:cond delay="0"/>
+                                          </p:stCondLst>
+                                        </p:cTn>
+                                        <p:tgtEl>
+                                          <p:spTgt spid="3">
+                                            <p:txEl>
+                                              <p:pRg st="0" end="0"/>
+                                            </p:txEl>
+                                          </p:spTgt>
+                                        </p:tgtEl>
+                                        <p:attrNameLst>
+                                          <p:attrName>style.visibility</p:attrName>
+                                        </p:attrNameLst>
+                                      </p:cBhvr>
+                                      <p:to>
+                                        <p:strVal val="visible"/>
+                                      </p:to>
+                                    </p:set>
+                                  </p:childTnLst>
+                                </p:cTn>
+                              </p:par>
+                            </p:childTnLst>
+                          </p:cTn>
+                        </p:par>
+                      </p:childTnLst>
+                    </p:cTn>
+                  </p:par>
+                  <p:par>
+                    <p:cTn id="7" fill="hold">
+                      <p:stCondLst>
+                        <p:cond delay="indefinite"/>
+                      </p:stCondLst>
+                      <p:childTnLst>
+                        <p:par>
+                          <p:cTn id="8" fill="hold">
+                            <p:stCondLst>
+                              <p:cond delay="0"/>
+                            </p:stCondLst>
+                            <p:childTnLst>
+                              <p:par>
+                                <p:cTn id="9" presetID="1" presetClass="entr" presetSubtype="0" fill="hold" nodeType="clickEffect">
+                                  <p:stCondLst>
+                                    <p:cond delay="0"/>
+                                  </p:stCondLst>
+                                  <p:childTnLst>
+                                    <p:set>
+                                      <p:cBhvr>
+                                        <p:cTn id="10" dur="1" fill="hold">
+                                          <p:stCondLst>
+                                            <p:cond delay="0"/>
+                                          </p:stCondLst>
+                                        </p:cTn>
+                                        <p:tgtEl>
+                                          <p:spTgt spid="3">
+                                            <p:txEl>
+                                              <p:pRg st="1" end="1"/>
+                                            </p:txEl>
+                                          </p:spTgt>
+                                        </p:tgtEl>
+                                        <p:attrNameLst>
+                                          <p:attrName>style.visibility</p:attrName>
+                                        </p:attrNameLst>
+                                      </p:cBhvr>
+                                      <p:to>
+                                        <p:strVal val="visible"/>
+                                      </p:to>
+                                    </p:set>
+                                  </p:childTnLst>
+                                </p:cTn>
+                              </p:par>
+                            </p:childTnLst>
+                          </p:cTn>
+                        </p:par>
+                      </p:childTnLst>
+                    </p:cTn>
+                  </p:par>
+                  <p:par>
+                    <p:cTn id="11" fill="hold">
+                      <p:stCondLst>
+                        <p:cond delay="indefinite"/>
+                      </p:stCondLst>
+                      <p:childTnLst>
+                        <p:par>
+                          <p:cTn id="12" fill="hold">
+                            <p:stCondLst>
+                              <p:cond delay="0"/>
+                            </p:stCondLst>
+                            <p:childTnLst>
+                              <p:par>
+                                <p:cTn id="13" presetID="1" presetClass="entr" presetSubtype="0" fill="hold" nodeType="clickEffect">
+                                  <p:stCondLst>
+                                    <p:cond delay="0"/>
+                                  </p:stCondLst>
+                                  <p:childTnLst>
+                                    <p:set>
+                                      <p:cBhvr>
+                                        <p:cTn id="14" dur="1" fill="hold">
+                                          <p:stCondLst>
+                                            <p:cond delay="0"/>
+                                          </p:stCondLst>
+                                        </p:cTn>
+                                        <p:tgtEl>
+                                          <p:spTgt spid="3">
+                                            <p:txEl>
+                                              <p:pRg st="2" end="2"/>
+                                            </p:txEl>
+                                          </p:spTgt>
+                                        </p:tgtEl>
+                                        <p:attrNameLst>
+                                          <p:attrName>style.visibility</p:attrName>
+                                        </p:attrNameLst>
+                                      </p:cBhvr>
+                                      <p:to>
+                                        <p:strVal val="visible"/>
+                                      </p:to>
+                                    </p:set>
+                                  </p:childTnLst>
+                                </p:cTn>
+                              </p:par>
+                            </p:childTnLst>
+                          </p:cTn>
+                        </p:par>
+                      </p:childTnLst>
+                    </p:cTn>
+                  </p:par>
+                  <p:par>
+                    <p:cTn id="15" fill="hold">
+                      <p:stCondLst>
+                        <p:cond delay="indefinite"/>
+                      </p:stCondLst>
+                      <p:childTnLst>
+                        <p:par>
+                          <p:cTn id="16" fill="hold">
+                            <p:stCondLst>
+                              <p:cond delay="0"/>
+                            </p:stCondLst>
+                            <p:childTnLst>
+                              <p:par>
+                                <p:cTn id="17" presetID="1" presetClass="entr" presetSubtype="0" fill="hold" nodeType="clickEffect">
+                                  <p:stCondLst>
+                                    <p:cond delay="0"/>
+                                  </p:stCondLst>
+                                  <p:childTnLst>
+                                    <p:set>
+                                      <p:cBhvr>
+                                        <p:cTn id="18" dur="1" fill="hold">
+                                          <p:stCondLst>
+                                            <p:cond delay="0"/>
+                                          </p:stCondLst>
+                                        </p:cTn>
+                                        <p:tgtEl>
+                                          <p:spTgt spid="3">
+                                            <p:txEl>
+                                              <p:pRg st="3" end="3"/>
+                                            </p:txEl>
+                                          </p:spTgt>
+                                        </p:tgtEl>
+                                        <p:attrNameLst>
+                                          <p:attrName>style.visibility</p:attrName>
+                                        </p:attrNameLst>
+                                      </p:cBhvr>
+                                      <p:to>
+                                        <p:strVal val="visible"/>
+                                      </p:to>
+                                    </p:set>
+                                  </p:childTnLst>
+                                </p:cTn>
+                              </p:par>
+                            </p:childTnLst>
+                          </p:cTn>
+                        </p:par>
+                      </p:childTnLst>
+                    </p:cTn>
+                  </p:par>
+                  <p:par>
+                    <p:cTn id="19" fill="hold">
+                      <p:stCondLst>
+                        <p:cond delay="indefinite"/>
+                      </p:stCondLst>
+                      <p:childTnLst>
+                        <p:par>
+                          <p:cTn id="20" fill="hold">
+                            <p:stCondLst>
+                              <p:cond delay="0"/>
+                            </p:stCondLst>
+                            <p:childTnLst>
+                              <p:par>
+                                <p:cTn id="21" presetID="1" presetClass="entr" presetSubtype="0" fill="hold" nodeType="clickEffect">
+                                  <p:stCondLst>
+                                    <p:cond delay="0"/>
+                                  </p:stCondLst>
+                                  <p:childTnLst>
+                                    <p:set>
+                                      <p:cBhvr>
+                                        <p:cTn id="22" dur="1" fill="hold">
+                                          <p:stCondLst>
+                                            <p:cond delay="0"/>
+                                          </p:stCondLst>
+                                        </p:cTn>
+                                        <p:tgtEl>
+                                          <p:spTgt spid="3">
+                                            <p:txEl>
+                                              <p:pRg st="4" end="4"/>
+                                            </p:txEl>
+                                          </p:spTgt>
+                                        </p:tgtEl>
+                                        <p:attrNameLst>
+                                          <p:attrName>style.visibility</p:attrName>
+                                        </p:attrNameLst>
+                                      </p:cBhvr>
+                                      <p:to>
+                                        <p:strVal val="visible"/>
+                                      </p:to>
+                                    </p:set>
+                                  </p:childTnLst>
+                                </p:cTn>
+                              </p:par>
+                            </p:childTnLst>
+                          </p:cTn>
+                        </p:par>
+                      </p:childTnLst>
+                    </p:cTn>
+                  </p:par>
+                  <p:par>
+                    <p:cTn id="23" fill="hold">
+                      <p:stCondLst>
+                        <p:cond delay="indefinite"/>
+                      </p:stCondLst>
+                      <p:childTnLst>
+                        <p:par>
+                          <p:cTn id="24" fill="hold">
+                            <p:stCondLst>
+                              <p:cond delay="0"/>
+                            </p:stCondLst>
+                            <p:childTnLst>
+                              <p:par>
+                                <p:cTn id="25" presetID="1" presetClass="entr" presetSubtype="0" fill="hold" nodeType="clickEffect">
+                                  <p:stCondLst>
+                                    <p:cond delay="0"/>
+                                  </p:stCondLst>
+                                  <p:childTnLst>
+                                    <p:set>
+                                      <p:cBhvr>
+                                        <p:cTn id="26" dur="1" fill="hold">
+                                          <p:stCondLst>
+                                            <p:cond delay="0"/>
+                                          </p:stCondLst>
+                                        </p:cTn>
+                                        <p:tgtEl>
+                                          <p:spTgt spid="3">
+                                            <p:txEl>
+                                              <p:pRg st="5" end="5"/>
+                                            </p:txEl>
+                                          </p:spTgt>
+                                        </p:tgtEl>
+                                        <p:attrNameLst>
+                                          <p:attrName>style.visibility</p:attrName>
+                                        </p:attrNameLst>
+                                      </p:cBhvr>
+                                      <p:to>
+                                        <p:strVal val="visible"/>
+                                      </p:to>
+                                    </p:set>
+                                  </p:childTnLst>
+                                </p:cTn>
+                              </p:par>
+                            </p:childTnLst>
+                          </p:cTn>
+                        </p:par>
+                      </p:childTnLst>
+                    </p:cTn>
+                  </p:par>
+                  <p:par>
+                    <p:cTn id="27" fill="hold">
+                      <p:stCondLst>
+                        <p:cond delay="indefinite"/>
+                      </p:stCondLst>
+                      <p:childTnLst>
+                        <p:par>
+                          <p:cTn id="28" fill="hold">
+                            <p:stCondLst>
+                              <p:cond delay="0"/>
+                            </p:stCondLst>
+                            <p:childTnLst>
+                              <p:par>
+                                <p:cTn id="29" presetID="1" presetClass="entr" presetSubtype="0" fill="hold" nodeType="clickEffect">
+                                  <p:stCondLst>
+                                    <p:cond delay="0"/>
+                                  </p:stCondLst>
+                                  <p:childTnLst>
+                                    <p:set>
+                                      <p:cBhvr>
+                                        <p:cTn id="30" dur="1" fill="hold">
+                                          <p:stCondLst>
+                                            <p:cond delay="0"/>
+                                          </p:stCondLst>
+                                        </p:cTn>
+                                        <p:tgtEl>
+                                          <p:spTgt spid="3">
+                                            <p:txEl>
+                                              <p:pRg st="6" end="6"/>
+                                            </p:txEl>
+                                          </p:spTgt>
+                                        </p:tgtEl>
+                                        <p:attrNameLst>
+                                          <p:attrName>style.visibility</p:attrName>
+                                        </p:attrNameLst>
+                                      </p:cBhvr>
+                                      <p:to>
+                                        <p:strVal val="visible"/>
+                                      </p:to>
+                                    </p:set>
+                                  </p:childTnLst>
+                                </p:cTn>
+                              </p:par>
+                            </p:childTnLst>
+                          </p:cTn>
+                        </p:par>
+                      </p:childTnLst>
+                    </p:cTn>
+                  </p:par>
+                </p:childTnLst>
+              </p:cTn>
+              <p:prevCondLst>
+                <p:cond evt="onPrev" delay="0">
+                  <p:tgtEl>
+                    <p:sldTgt/>
+                  </p:tgtEl>
+                </p:cond>
+              </p:prevCondLst>
+              <p:nextCondLst>
+                <p:cond evt="onNext" delay="0">
+                  <p:tgtEl>
+                    <p:sldTgt/>
+                  </p:tgtEl>
+                </p:cond>
+              </p:nextCondLst>
+            </p:seq>
+          </p:childTnLst>
+        </p:cTn>
+      </p:par>
+    </p:tnLst>
+  </p:timing>
+</p:sld>
+</file>
+
+<file path=ppt/slides/slide21.xml><?xml version="1.0" encoding="utf-8"?>
+<p:sld xmlns:a="http://schemas.openxmlformats.org/drawingml/2006/main" xmlns:r="http://schemas.openxmlformats.org/officeDocument/2006/relationships" xmlns:p="http://schemas.openxmlformats.org/presentationml/2006/main">
+  <p:cSld>
+    <p:spTree>
+      <p:nvGrpSpPr>
+        <p:cNvPr id="1" name=""/>
+        <p:cNvGrpSpPr/>
+        <p:nvPr/>
+      </p:nvGrpSpPr>
+      <p:grpSpPr>
+        <a:xfrm>
+          <a:off x="0" y="0"/>
+          <a:ext cx="0" cy="0"/>
+          <a:chOff x="0" y="0"/>
+          <a:chExt cx="0" cy="0"/>
+        </a:xfrm>
+      </p:grpSpPr>
+      <p:sp>
+        <p:nvSpPr>
+          <p:cNvPr id="2" name="Title 1"/>
+          <p:cNvSpPr>
+            <a:spLocks noGrp="1"/>
+          </p:cNvSpPr>
+          <p:nvPr>
+            <p:ph type="title"/>
+          </p:nvPr>
+        </p:nvSpPr>
+        <p:spPr/>
+        <p:txBody>
+          <a:bodyPr/>
+          <a:lstStyle/>
+          <a:p>
+            <a:r>
+              <a:rPr lang="en-US" dirty="0"/>
               <a:t>disclaimer</a:t>
             </a:r>
           </a:p>
@@ -6233,7 +8715,7 @@
 </p:sld>
 </file>
 
-<file path=ppt/slides/slide21.xml><?xml version="1.0" encoding="utf-8"?>
+<file path=ppt/slides/slide22.xml><?xml version="1.0" encoding="utf-8"?>
 <p:sld xmlns:a="http://schemas.openxmlformats.org/drawingml/2006/main" xmlns:r="http://schemas.openxmlformats.org/officeDocument/2006/relationships" xmlns:p="http://schemas.openxmlformats.org/presentationml/2006/main">
   <p:cSld>
     <p:spTree>
@@ -6408,7 +8890,7 @@
 </p:sld>
 </file>
 
-<file path=ppt/slides/slide22.xml><?xml version="1.0" encoding="utf-8"?>
+<file path=ppt/slides/slide23.xml><?xml version="1.0" encoding="utf-8"?>
 <p:sld xmlns:a="http://schemas.openxmlformats.org/drawingml/2006/main" xmlns:r="http://schemas.openxmlformats.org/officeDocument/2006/relationships" xmlns:p="http://schemas.openxmlformats.org/presentationml/2006/main">
   <p:cSld>
     <p:spTree>
@@ -6582,7 +9064,7 @@
           <a:p>
             <a:r>
               <a:rPr lang="en-US" sz="3200" dirty="0"/>
-              <a:t>OSWASP – Open Web Application Security Project</a:t>
+              <a:t>OWASP – Open Web Application Security Project</a:t>
             </a:r>
           </a:p>
           <a:p>
@@ -6602,6 +9084,47 @@
           </a:p>
         </p:txBody>
       </p:sp>
+      <p:pic>
+        <p:nvPicPr>
+          <p:cNvPr id="2050" name="Picture 2" descr="http://www.htmlandcssbook.com/images/press/book-paragraph.jpg"/>
+          <p:cNvPicPr>
+            <a:picLocks noChangeAspect="1" noChangeArrowheads="1"/>
+          </p:cNvPicPr>
+          <p:nvPr/>
+        </p:nvPicPr>
+        <p:blipFill>
+          <a:blip r:embed="rId3">
+            <a:extLst>
+              <a:ext uri="{28A0092B-C50C-407E-A947-70E740481C1C}">
+                <a14:useLocalDpi xmlns:a14="http://schemas.microsoft.com/office/drawing/2010/main" val="0"/>
+              </a:ext>
+            </a:extLst>
+          </a:blip>
+          <a:srcRect/>
+          <a:stretch>
+            <a:fillRect/>
+          </a:stretch>
+        </p:blipFill>
+        <p:spPr bwMode="auto">
+          <a:xfrm>
+            <a:off x="6035709" y="3424285"/>
+            <a:ext cx="4655738" cy="2899054"/>
+          </a:xfrm>
+          <a:prstGeom prst="rect">
+            <a:avLst/>
+          </a:prstGeom>
+          <a:noFill/>
+          <a:extLst>
+            <a:ext uri="{909E8E84-426E-40DD-AFC4-6F175D3DCCD1}">
+              <a14:hiddenFill xmlns:a14="http://schemas.microsoft.com/office/drawing/2010/main">
+                <a:solidFill>
+                  <a:srgbClr val="FFFFFF"/>
+                </a:solidFill>
+              </a14:hiddenFill>
+            </a:ext>
+          </a:extLst>
+        </p:spPr>
+      </p:pic>
     </p:spTree>
     <p:extLst>
       <p:ext uri="{BB962C8B-B14F-4D97-AF65-F5344CB8AC3E}">
@@ -7362,15 +9885,33 @@
                                   </p:childTnLst>
                                 </p:cTn>
                               </p:par>
+                            </p:childTnLst>
+                          </p:cTn>
+                        </p:par>
+                      </p:childTnLst>
+                    </p:cTn>
+                  </p:par>
+                  <p:par>
+                    <p:cTn id="35" fill="hold">
+                      <p:stCondLst>
+                        <p:cond delay="indefinite"/>
+                      </p:stCondLst>
+                      <p:childTnLst>
+                        <p:par>
+                          <p:cTn id="36" fill="hold">
+                            <p:stCondLst>
+                              <p:cond delay="0"/>
+                            </p:stCondLst>
+                            <p:childTnLst>
                               <p:par>
-                                <p:cTn id="35" presetID="1" presetClass="entr" presetSubtype="0" fill="hold" nodeType="withEffect">
+                                <p:cTn id="37" presetID="1" presetClass="entr" presetSubtype="0" fill="hold" nodeType="clickEffect">
                                   <p:stCondLst>
                                     <p:cond delay="0"/>
                                   </p:stCondLst>
                                   <p:childTnLst>
                                     <p:set>
                                       <p:cBhvr>
-                                        <p:cTn id="36" dur="1" fill="hold">
+                                        <p:cTn id="38" dur="1" fill="hold">
                                           <p:stCondLst>
                                             <p:cond delay="0"/>
                                           </p:stCondLst>
@@ -7389,15 +9930,24 @@
                                   </p:childTnLst>
                                 </p:cTn>
                               </p:par>
+                            </p:childTnLst>
+                          </p:cTn>
+                        </p:par>
+                        <p:par>
+                          <p:cTn id="39" fill="hold">
+                            <p:stCondLst>
+                              <p:cond delay="0"/>
+                            </p:stCondLst>
+                            <p:childTnLst>
                               <p:par>
-                                <p:cTn id="37" presetID="1" presetClass="entr" presetSubtype="0" fill="hold" nodeType="withEffect">
+                                <p:cTn id="40" presetID="1" presetClass="entr" presetSubtype="0" fill="hold" nodeType="afterEffect">
                                   <p:stCondLst>
                                     <p:cond delay="0"/>
                                   </p:stCondLst>
                                   <p:childTnLst>
                                     <p:set>
                                       <p:cBhvr>
-                                        <p:cTn id="38" dur="1" fill="hold">
+                                        <p:cTn id="41" dur="1" fill="hold">
                                           <p:stCondLst>
                                             <p:cond delay="0"/>
                                           </p:stCondLst>
@@ -8405,7 +10955,7 @@
             </a:r>
             <a:r>
               <a:rPr lang="en-US" dirty="0"/>
-              <a:t> in front</a:t>
+              <a:t> space in front</a:t>
             </a:r>
           </a:p>
         </p:txBody>

</xml_diff>